<commit_message>
Added literacture for lang
</commit_message>
<xml_diff>
--- a/lecture12-languages/lecture12-languages.pptx
+++ b/lecture12-languages/lecture12-languages.pptx
@@ -5,31 +5,30 @@
     <p:sldMasterId id="2147483648" r:id="rId1"/>
   </p:sldMasterIdLst>
   <p:notesMasterIdLst>
-    <p:notesMasterId r:id="rId21"/>
+    <p:notesMasterId r:id="rId20"/>
   </p:notesMasterIdLst>
   <p:handoutMasterIdLst>
-    <p:handoutMasterId r:id="rId22"/>
+    <p:handoutMasterId r:id="rId21"/>
   </p:handoutMasterIdLst>
   <p:sldIdLst>
     <p:sldId id="256" r:id="rId2"/>
     <p:sldId id="281" r:id="rId3"/>
     <p:sldId id="279" r:id="rId4"/>
-    <p:sldId id="258" r:id="rId5"/>
-    <p:sldId id="280" r:id="rId6"/>
+    <p:sldId id="280" r:id="rId5"/>
+    <p:sldId id="258" r:id="rId6"/>
     <p:sldId id="282" r:id="rId7"/>
     <p:sldId id="285" r:id="rId8"/>
     <p:sldId id="295" r:id="rId9"/>
     <p:sldId id="296" r:id="rId10"/>
     <p:sldId id="286" r:id="rId11"/>
-    <p:sldId id="287" r:id="rId12"/>
-    <p:sldId id="288" r:id="rId13"/>
-    <p:sldId id="290" r:id="rId14"/>
-    <p:sldId id="293" r:id="rId15"/>
-    <p:sldId id="297" r:id="rId16"/>
-    <p:sldId id="294" r:id="rId17"/>
-    <p:sldId id="299" r:id="rId18"/>
-    <p:sldId id="298" r:id="rId19"/>
-    <p:sldId id="277" r:id="rId20"/>
+    <p:sldId id="288" r:id="rId12"/>
+    <p:sldId id="290" r:id="rId13"/>
+    <p:sldId id="293" r:id="rId14"/>
+    <p:sldId id="297" r:id="rId15"/>
+    <p:sldId id="294" r:id="rId16"/>
+    <p:sldId id="299" r:id="rId17"/>
+    <p:sldId id="298" r:id="rId18"/>
+    <p:sldId id="277" r:id="rId19"/>
   </p:sldIdLst>
   <p:sldSz cx="9144000" cy="5688013"/>
   <p:notesSz cx="6858000" cy="9144000"/>
@@ -1152,7 +1151,7 @@
     </p:spTree>
     <p:extLst>
       <p:ext uri="{BB962C8B-B14F-4D97-AF65-F5344CB8AC3E}">
-        <p14:creationId xmlns:p14="http://schemas.microsoft.com/office/powerpoint/2010/main" val="1847617908"/>
+        <p14:creationId xmlns:p14="http://schemas.microsoft.com/office/powerpoint/2010/main" val="726338502"/>
       </p:ext>
     </p:extLst>
   </p:cSld>
@@ -1232,7 +1231,7 @@
     </p:spTree>
     <p:extLst>
       <p:ext uri="{BB962C8B-B14F-4D97-AF65-F5344CB8AC3E}">
-        <p14:creationId xmlns:p14="http://schemas.microsoft.com/office/powerpoint/2010/main" val="726338502"/>
+        <p14:creationId xmlns:p14="http://schemas.microsoft.com/office/powerpoint/2010/main" val="3040865142"/>
       </p:ext>
     </p:extLst>
   </p:cSld>
@@ -1312,7 +1311,7 @@
     </p:spTree>
     <p:extLst>
       <p:ext uri="{BB962C8B-B14F-4D97-AF65-F5344CB8AC3E}">
-        <p14:creationId xmlns:p14="http://schemas.microsoft.com/office/powerpoint/2010/main" val="3040865142"/>
+        <p14:creationId xmlns:p14="http://schemas.microsoft.com/office/powerpoint/2010/main" val="988660765"/>
       </p:ext>
     </p:extLst>
   </p:cSld>
@@ -1392,7 +1391,7 @@
     </p:spTree>
     <p:extLst>
       <p:ext uri="{BB962C8B-B14F-4D97-AF65-F5344CB8AC3E}">
-        <p14:creationId xmlns:p14="http://schemas.microsoft.com/office/powerpoint/2010/main" val="988660765"/>
+        <p14:creationId xmlns:p14="http://schemas.microsoft.com/office/powerpoint/2010/main" val="958770814"/>
       </p:ext>
     </p:extLst>
   </p:cSld>
@@ -1472,7 +1471,7 @@
     </p:spTree>
     <p:extLst>
       <p:ext uri="{BB962C8B-B14F-4D97-AF65-F5344CB8AC3E}">
-        <p14:creationId xmlns:p14="http://schemas.microsoft.com/office/powerpoint/2010/main" val="958770814"/>
+        <p14:creationId xmlns:p14="http://schemas.microsoft.com/office/powerpoint/2010/main" val="3706603347"/>
       </p:ext>
     </p:extLst>
   </p:cSld>
@@ -1552,7 +1551,7 @@
     </p:spTree>
     <p:extLst>
       <p:ext uri="{BB962C8B-B14F-4D97-AF65-F5344CB8AC3E}">
-        <p14:creationId xmlns:p14="http://schemas.microsoft.com/office/powerpoint/2010/main" val="3706603347"/>
+        <p14:creationId xmlns:p14="http://schemas.microsoft.com/office/powerpoint/2010/main" val="1988751468"/>
       </p:ext>
     </p:extLst>
   </p:cSld>
@@ -1563,86 +1562,6 @@
 </file>
 
 <file path=ppt/notesSlides/notesSlide16.xml><?xml version="1.0" encoding="utf-8"?>
-<p:notes xmlns:a="http://schemas.openxmlformats.org/drawingml/2006/main" xmlns:r="http://schemas.openxmlformats.org/officeDocument/2006/relationships" xmlns:p="http://schemas.openxmlformats.org/presentationml/2006/main">
-  <p:cSld>
-    <p:spTree>
-      <p:nvGrpSpPr>
-        <p:cNvPr id="1" name=""/>
-        <p:cNvGrpSpPr/>
-        <p:nvPr/>
-      </p:nvGrpSpPr>
-      <p:grpSpPr>
-        <a:xfrm>
-          <a:off x="0" y="0"/>
-          <a:ext cx="0" cy="0"/>
-          <a:chOff x="0" y="0"/>
-          <a:chExt cx="0" cy="0"/>
-        </a:xfrm>
-      </p:grpSpPr>
-      <p:sp>
-        <p:nvSpPr>
-          <p:cNvPr id="2" name="Slide Image Placeholder 1"/>
-          <p:cNvSpPr>
-            <a:spLocks noGrp="1" noRot="1" noChangeAspect="1"/>
-          </p:cNvSpPr>
-          <p:nvPr>
-            <p:ph type="sldImg"/>
-          </p:nvPr>
-        </p:nvSpPr>
-        <p:spPr>
-          <a:xfrm>
-            <a:off x="673100" y="685800"/>
-            <a:ext cx="5511800" cy="3429000"/>
-          </a:xfrm>
-          <a:solidFill>
-            <a:srgbClr val="4F81BD"/>
-          </a:solidFill>
-          <a:ln w="25557">
-            <a:solidFill>
-              <a:srgbClr val="385D8A"/>
-            </a:solidFill>
-            <a:prstDash val="solid"/>
-          </a:ln>
-        </p:spPr>
-      </p:sp>
-      <p:sp>
-        <p:nvSpPr>
-          <p:cNvPr id="3" name="Notes Placeholder 2"/>
-          <p:cNvSpPr txBox="1">
-            <a:spLocks noGrp="1"/>
-          </p:cNvSpPr>
-          <p:nvPr>
-            <p:ph type="body" sz="quarter" idx="1"/>
-          </p:nvPr>
-        </p:nvSpPr>
-        <p:spPr>
-          <a:xfrm>
-            <a:off x="685800" y="4343400"/>
-            <a:ext cx="5486400" cy="4115156"/>
-          </a:xfrm>
-        </p:spPr>
-        <p:txBody>
-          <a:bodyPr lIns="0" tIns="0" rIns="0" bIns="0"/>
-          <a:lstStyle/>
-          <a:p>
-            <a:endParaRPr lang="ru-RU"/>
-          </a:p>
-        </p:txBody>
-      </p:sp>
-    </p:spTree>
-    <p:extLst>
-      <p:ext uri="{BB962C8B-B14F-4D97-AF65-F5344CB8AC3E}">
-        <p14:creationId xmlns:p14="http://schemas.microsoft.com/office/powerpoint/2010/main" val="1988751468"/>
-      </p:ext>
-    </p:extLst>
-  </p:cSld>
-  <p:clrMapOvr>
-    <a:masterClrMapping/>
-  </p:clrMapOvr>
-</p:notes>
-</file>
-
-<file path=ppt/notesSlides/notesSlide17.xml><?xml version="1.0" encoding="utf-8"?>
 <p:notes xmlns:a="http://schemas.openxmlformats.org/drawingml/2006/main" xmlns:r="http://schemas.openxmlformats.org/officeDocument/2006/relationships" xmlns:p="http://schemas.openxmlformats.org/presentationml/2006/main">
   <p:cSld>
     <p:spTree>
@@ -2034,7 +1953,7 @@
     </p:spTree>
     <p:extLst>
       <p:ext uri="{BB962C8B-B14F-4D97-AF65-F5344CB8AC3E}">
-        <p14:creationId xmlns:p14="http://schemas.microsoft.com/office/powerpoint/2010/main" val="2899050368"/>
+        <p14:creationId xmlns:p14="http://schemas.microsoft.com/office/powerpoint/2010/main" val="515356689"/>
       </p:ext>
     </p:extLst>
   </p:cSld>
@@ -2114,7 +2033,7 @@
     </p:spTree>
     <p:extLst>
       <p:ext uri="{BB962C8B-B14F-4D97-AF65-F5344CB8AC3E}">
-        <p14:creationId xmlns:p14="http://schemas.microsoft.com/office/powerpoint/2010/main" val="515356689"/>
+        <p14:creationId xmlns:p14="http://schemas.microsoft.com/office/powerpoint/2010/main" val="2899050368"/>
       </p:ext>
     </p:extLst>
   </p:cSld>
@@ -2434,7 +2353,7 @@
     </p:spTree>
     <p:extLst>
       <p:ext uri="{BB962C8B-B14F-4D97-AF65-F5344CB8AC3E}">
-        <p14:creationId xmlns:p14="http://schemas.microsoft.com/office/powerpoint/2010/main" val="2092341373"/>
+        <p14:creationId xmlns:p14="http://schemas.microsoft.com/office/powerpoint/2010/main" val="1847617908"/>
       </p:ext>
     </p:extLst>
   </p:cSld>
@@ -3695,7 +3614,19 @@
             </a:pPr>
             <a:r>
               <a:rPr lang="ru-RU" dirty="0" smtClean="0"/>
-              <a:t>Абстракции аппаратуры (1/3)</a:t>
+              <a:t>Абстракции аппаратуры (</a:t>
+            </a:r>
+            <a:r>
+              <a:rPr lang="ru-RU" dirty="0" smtClean="0"/>
+              <a:t>1/</a:t>
+            </a:r>
+            <a:r>
+              <a:rPr lang="en-US" dirty="0" smtClean="0"/>
+              <a:t>2</a:t>
+            </a:r>
+            <a:r>
+              <a:rPr lang="ru-RU" dirty="0" smtClean="0"/>
+              <a:t>)</a:t>
             </a:r>
             <a:endParaRPr lang="ru-RU" dirty="0"/>
           </a:p>
@@ -3908,8 +3839,8 @@
         </p:nvSpPr>
         <p:spPr>
           <a:xfrm>
-            <a:off x="251520" y="1691878"/>
-            <a:ext cx="8640960" cy="3046988"/>
+            <a:off x="251520" y="1188397"/>
+            <a:ext cx="8640960" cy="4031873"/>
           </a:xfrm>
           <a:prstGeom prst="rect">
             <a:avLst/>
@@ -3948,7 +3879,31 @@
                 <a:ea typeface="DejaVu Sans" panose="020B0603030804020204" pitchFamily="34" charset="0"/>
                 <a:cs typeface="DejaVu Sans" panose="020B0603030804020204" pitchFamily="34" charset="0"/>
               </a:rPr>
-              <a:t>Сигналы – логический уровень (</a:t>
+              <a:t>Сигналы</a:t>
+            </a:r>
+            <a:r>
+              <a:rPr lang="en-US" sz="3200" dirty="0" smtClean="0">
+                <a:latin typeface="DejaVu Sans" panose="020B0603030804020204" pitchFamily="34" charset="0"/>
+                <a:ea typeface="DejaVu Sans" panose="020B0603030804020204" pitchFamily="34" charset="0"/>
+                <a:cs typeface="DejaVu Sans" panose="020B0603030804020204" pitchFamily="34" charset="0"/>
+              </a:rPr>
+              <a:t> — </a:t>
+            </a:r>
+            <a:r>
+              <a:rPr lang="ru-RU" sz="3200" dirty="0" smtClean="0">
+                <a:latin typeface="DejaVu Sans" panose="020B0603030804020204" pitchFamily="34" charset="0"/>
+                <a:ea typeface="DejaVu Sans" panose="020B0603030804020204" pitchFamily="34" charset="0"/>
+                <a:cs typeface="DejaVu Sans" panose="020B0603030804020204" pitchFamily="34" charset="0"/>
+              </a:rPr>
+              <a:t>логический </a:t>
+            </a:r>
+            <a:r>
+              <a:rPr lang="ru-RU" sz="3200" dirty="0" smtClean="0">
+                <a:latin typeface="DejaVu Sans" panose="020B0603030804020204" pitchFamily="34" charset="0"/>
+                <a:ea typeface="DejaVu Sans" panose="020B0603030804020204" pitchFamily="34" charset="0"/>
+                <a:cs typeface="DejaVu Sans" panose="020B0603030804020204" pitchFamily="34" charset="0"/>
+              </a:rPr>
+              <a:t>уровень (</a:t>
             </a:r>
             <a:r>
               <a:rPr lang="ru-RU" sz="3200" dirty="0" smtClean="0">
@@ -4007,7 +3962,31 @@
                 <a:ea typeface="DejaVu Sans" panose="020B0603030804020204" pitchFamily="34" charset="0"/>
                 <a:cs typeface="DejaVu Sans" panose="020B0603030804020204" pitchFamily="34" charset="0"/>
               </a:rPr>
-              <a:t>Шины – передача групп бит</a:t>
+              <a:t>Шины </a:t>
+            </a:r>
+            <a:r>
+              <a:rPr lang="en-US" sz="3200" dirty="0">
+                <a:latin typeface="DejaVu Sans" panose="020B0603030804020204" pitchFamily="34" charset="0"/>
+                <a:ea typeface="DejaVu Sans" panose="020B0603030804020204" pitchFamily="34" charset="0"/>
+                <a:cs typeface="DejaVu Sans" panose="020B0603030804020204" pitchFamily="34" charset="0"/>
+              </a:rPr>
+              <a:t>—</a:t>
+            </a:r>
+            <a:r>
+              <a:rPr lang="ru-RU" sz="3200" dirty="0" smtClean="0">
+                <a:latin typeface="DejaVu Sans" panose="020B0603030804020204" pitchFamily="34" charset="0"/>
+                <a:ea typeface="DejaVu Sans" panose="020B0603030804020204" pitchFamily="34" charset="0"/>
+                <a:cs typeface="DejaVu Sans" panose="020B0603030804020204" pitchFamily="34" charset="0"/>
+              </a:rPr>
+              <a:t> </a:t>
+            </a:r>
+            <a:r>
+              <a:rPr lang="ru-RU" sz="3200" dirty="0" smtClean="0">
+                <a:latin typeface="DejaVu Sans" panose="020B0603030804020204" pitchFamily="34" charset="0"/>
+                <a:ea typeface="DejaVu Sans" panose="020B0603030804020204" pitchFamily="34" charset="0"/>
+                <a:cs typeface="DejaVu Sans" panose="020B0603030804020204" pitchFamily="34" charset="0"/>
+              </a:rPr>
+              <a:t>передача групп бит</a:t>
             </a:r>
           </a:p>
           <a:p>
@@ -4035,7 +4014,15 @@
                 <a:ea typeface="DejaVu Sans" panose="020B0603030804020204" pitchFamily="34" charset="0"/>
                 <a:cs typeface="DejaVu Sans" panose="020B0603030804020204" pitchFamily="34" charset="0"/>
               </a:rPr>
-              <a:t>Транзакции – отображение направления </a:t>
+              <a:t>Транзакции </a:t>
+            </a:r>
+            <a:r>
+              <a:rPr lang="en-US" sz="3200" dirty="0">
+                <a:latin typeface="DejaVu Sans" panose="020B0603030804020204" pitchFamily="34" charset="0"/>
+                <a:ea typeface="DejaVu Sans" panose="020B0603030804020204" pitchFamily="34" charset="0"/>
+                <a:cs typeface="DejaVu Sans" panose="020B0603030804020204" pitchFamily="34" charset="0"/>
+              </a:rPr>
+              <a:t>—</a:t>
             </a:r>
             <a:r>
               <a:rPr lang="ru-RU" sz="3200" dirty="0" smtClean="0">
@@ -4043,7 +4030,50 @@
                 <a:ea typeface="DejaVu Sans" panose="020B0603030804020204" pitchFamily="34" charset="0"/>
                 <a:cs typeface="DejaVu Sans" panose="020B0603030804020204" pitchFamily="34" charset="0"/>
               </a:rPr>
+              <a:t> </a:t>
+            </a:r>
+            <a:r>
+              <a:rPr lang="ru-RU" sz="3200" dirty="0">
+                <a:latin typeface="DejaVu Sans" panose="020B0603030804020204" pitchFamily="34" charset="0"/>
+                <a:ea typeface="DejaVu Sans" panose="020B0603030804020204" pitchFamily="34" charset="0"/>
+                <a:cs typeface="DejaVu Sans" panose="020B0603030804020204" pitchFamily="34" charset="0"/>
+              </a:rPr>
+              <a:t>отображение направления </a:t>
+            </a:r>
+            <a:r>
+              <a:rPr lang="ru-RU" sz="3200" dirty="0" smtClean="0">
+                <a:latin typeface="DejaVu Sans" panose="020B0603030804020204" pitchFamily="34" charset="0"/>
+                <a:ea typeface="DejaVu Sans" panose="020B0603030804020204" pitchFamily="34" charset="0"/>
+                <a:cs typeface="DejaVu Sans" panose="020B0603030804020204" pitchFamily="34" charset="0"/>
+              </a:rPr>
               <a:t>сигнала</a:t>
+            </a:r>
+            <a:endParaRPr lang="en-US" sz="3200" dirty="0" smtClean="0">
+              <a:latin typeface="DejaVu Sans" panose="020B0603030804020204" pitchFamily="34" charset="0"/>
+              <a:ea typeface="DejaVu Sans" panose="020B0603030804020204" pitchFamily="34" charset="0"/>
+              <a:cs typeface="DejaVu Sans" panose="020B0603030804020204" pitchFamily="34" charset="0"/>
+            </a:endParaRPr>
+          </a:p>
+          <a:p>
+            <a:pPr marL="571500" indent="-571500">
+              <a:buFont typeface="Arial" pitchFamily="34" charset="0"/>
+              <a:buChar char="•"/>
+            </a:pPr>
+            <a:r>
+              <a:rPr lang="ru-RU" sz="3200" dirty="0">
+                <a:latin typeface="DejaVu Sans" panose="020B0603030804020204" pitchFamily="34" charset="0"/>
+                <a:ea typeface="DejaVu Sans" panose="020B0603030804020204" pitchFamily="34" charset="0"/>
+                <a:cs typeface="DejaVu Sans" panose="020B0603030804020204" pitchFamily="34" charset="0"/>
+              </a:rPr>
+              <a:t>Абстракции хранения данных: группы регистров, банки </a:t>
+            </a:r>
+            <a:r>
+              <a:rPr lang="ru-RU" sz="3200" dirty="0" smtClean="0">
+                <a:latin typeface="DejaVu Sans" panose="020B0603030804020204" pitchFamily="34" charset="0"/>
+                <a:ea typeface="DejaVu Sans" panose="020B0603030804020204" pitchFamily="34" charset="0"/>
+                <a:cs typeface="DejaVu Sans" panose="020B0603030804020204" pitchFamily="34" charset="0"/>
+              </a:rPr>
+              <a:t>памяти</a:t>
             </a:r>
             <a:endParaRPr lang="ru-RU" sz="3200" dirty="0">
               <a:latin typeface="DejaVu Sans" panose="020B0603030804020204" pitchFamily="34" charset="0"/>
@@ -4118,7 +4148,27 @@
             </a:pPr>
             <a:r>
               <a:rPr lang="ru-RU" dirty="0" smtClean="0"/>
-              <a:t>Абстракции аппаратуры (2/3)</a:t>
+              <a:t>Абстракции аппаратуры </a:t>
+            </a:r>
+            <a:r>
+              <a:rPr lang="ru-RU" dirty="0" smtClean="0"/>
+              <a:t>(</a:t>
+            </a:r>
+            <a:r>
+              <a:rPr lang="en-US" dirty="0" smtClean="0"/>
+              <a:t>2</a:t>
+            </a:r>
+            <a:r>
+              <a:rPr lang="ru-RU" dirty="0" smtClean="0"/>
+              <a:t>/</a:t>
+            </a:r>
+            <a:r>
+              <a:rPr lang="en-US" dirty="0" smtClean="0"/>
+              <a:t>2</a:t>
+            </a:r>
+            <a:r>
+              <a:rPr lang="ru-RU" dirty="0" smtClean="0"/>
+              <a:t>)</a:t>
             </a:r>
             <a:endParaRPr lang="ru-RU" dirty="0"/>
           </a:p>
@@ -4331,8 +4381,8 @@
         </p:nvSpPr>
         <p:spPr>
           <a:xfrm>
-            <a:off x="251520" y="1565860"/>
-            <a:ext cx="8640960" cy="3046988"/>
+            <a:off x="251520" y="2210450"/>
+            <a:ext cx="8640960" cy="1569660"/>
           </a:xfrm>
           <a:prstGeom prst="rect">
             <a:avLst/>
@@ -4371,71 +4421,7 @@
                 <a:ea typeface="DejaVu Sans" panose="020B0603030804020204" pitchFamily="34" charset="0"/>
                 <a:cs typeface="DejaVu Sans" panose="020B0603030804020204" pitchFamily="34" charset="0"/>
               </a:rPr>
-              <a:t>Расширенные </a:t>
-            </a:r>
-            <a:r>
-              <a:rPr lang="ru-RU" sz="3200" dirty="0">
-                <a:latin typeface="DejaVu Sans" panose="020B0603030804020204" pitchFamily="34" charset="0"/>
-                <a:ea typeface="DejaVu Sans" panose="020B0603030804020204" pitchFamily="34" charset="0"/>
-                <a:cs typeface="DejaVu Sans" panose="020B0603030804020204" pitchFamily="34" charset="0"/>
-              </a:rPr>
-              <a:t>значения для уровней </a:t>
-            </a:r>
-            <a:r>
-              <a:rPr lang="ru-RU" sz="3200" dirty="0" smtClean="0">
-                <a:latin typeface="DejaVu Sans" panose="020B0603030804020204" pitchFamily="34" charset="0"/>
-                <a:ea typeface="DejaVu Sans" panose="020B0603030804020204" pitchFamily="34" charset="0"/>
-                <a:cs typeface="DejaVu Sans" panose="020B0603030804020204" pitchFamily="34" charset="0"/>
-              </a:rPr>
-              <a:t>сигналов</a:t>
-            </a:r>
-            <a:r>
-              <a:rPr lang="en-US" sz="3200" dirty="0" smtClean="0">
-                <a:latin typeface="DejaVu Sans" panose="020B0603030804020204" pitchFamily="34" charset="0"/>
-                <a:ea typeface="DejaVu Sans" panose="020B0603030804020204" pitchFamily="34" charset="0"/>
-                <a:cs typeface="DejaVu Sans" panose="020B0603030804020204" pitchFamily="34" charset="0"/>
-              </a:rPr>
-              <a:t>: </a:t>
-            </a:r>
-            <a:r>
-              <a:rPr lang="ru-RU" sz="3200" dirty="0" smtClean="0">
-                <a:latin typeface="DejaVu Sans" panose="020B0603030804020204" pitchFamily="34" charset="0"/>
-                <a:ea typeface="DejaVu Sans" panose="020B0603030804020204" pitchFamily="34" charset="0"/>
-                <a:cs typeface="DejaVu Sans" panose="020B0603030804020204" pitchFamily="34" charset="0"/>
-              </a:rPr>
-              <a:t>непроводящий (</a:t>
-            </a:r>
-            <a:r>
-              <a:rPr lang="en-US" sz="3200" dirty="0" smtClean="0">
-                <a:latin typeface="DejaVu Sans" panose="020B0603030804020204" pitchFamily="34" charset="0"/>
-                <a:ea typeface="DejaVu Sans" panose="020B0603030804020204" pitchFamily="34" charset="0"/>
-                <a:cs typeface="DejaVu Sans" panose="020B0603030804020204" pitchFamily="34" charset="0"/>
-              </a:rPr>
-              <a:t>hi-Z</a:t>
-            </a:r>
-            <a:r>
-              <a:rPr lang="ru-RU" sz="3200" dirty="0" smtClean="0">
-                <a:latin typeface="DejaVu Sans" panose="020B0603030804020204" pitchFamily="34" charset="0"/>
-                <a:ea typeface="DejaVu Sans" panose="020B0603030804020204" pitchFamily="34" charset="0"/>
-                <a:cs typeface="DejaVu Sans" panose="020B0603030804020204" pitchFamily="34" charset="0"/>
-              </a:rPr>
-              <a:t>) или неопределенный (</a:t>
-            </a:r>
-            <a:r>
-              <a:rPr lang="en-US" sz="3200" dirty="0" smtClean="0">
-                <a:latin typeface="DejaVu Sans" panose="020B0603030804020204" pitchFamily="34" charset="0"/>
-                <a:ea typeface="DejaVu Sans" panose="020B0603030804020204" pitchFamily="34" charset="0"/>
-                <a:cs typeface="DejaVu Sans" panose="020B0603030804020204" pitchFamily="34" charset="0"/>
-              </a:rPr>
-              <a:t>X</a:t>
-            </a:r>
-            <a:r>
-              <a:rPr lang="ru-RU" sz="3200" dirty="0" smtClean="0">
-                <a:latin typeface="DejaVu Sans" panose="020B0603030804020204" pitchFamily="34" charset="0"/>
-                <a:ea typeface="DejaVu Sans" panose="020B0603030804020204" pitchFamily="34" charset="0"/>
-                <a:cs typeface="DejaVu Sans" panose="020B0603030804020204" pitchFamily="34" charset="0"/>
-              </a:rPr>
-              <a:t>)</a:t>
+              <a:t>Карты памяти</a:t>
             </a:r>
           </a:p>
           <a:p>
@@ -4449,31 +4435,9 @@
                 <a:ea typeface="DejaVu Sans" panose="020B0603030804020204" pitchFamily="34" charset="0"/>
                 <a:cs typeface="DejaVu Sans" panose="020B0603030804020204" pitchFamily="34" charset="0"/>
               </a:rPr>
-              <a:t>Абстракции хранения данных: группы регистров, банки памяти ...</a:t>
-            </a:r>
-          </a:p>
-          <a:p>
-            <a:pPr marL="1028700" lvl="1" indent="-571500">
-              <a:buFont typeface="Arial" pitchFamily="34" charset="0"/>
-              <a:buChar char="•"/>
-            </a:pPr>
-            <a:r>
-              <a:rPr lang="ru-RU" sz="3200" dirty="0">
-                <a:latin typeface="DejaVu Sans" panose="020B0603030804020204" pitchFamily="34" charset="0"/>
-                <a:ea typeface="DejaVu Sans" panose="020B0603030804020204" pitchFamily="34" charset="0"/>
-                <a:cs typeface="DejaVu Sans" panose="020B0603030804020204" pitchFamily="34" charset="0"/>
-              </a:rPr>
-              <a:t>Побочные </a:t>
-            </a:r>
-            <a:r>
-              <a:rPr lang="ru-RU" sz="3200" dirty="0" smtClean="0">
-                <a:latin typeface="DejaVu Sans" panose="020B0603030804020204" pitchFamily="34" charset="0"/>
-                <a:ea typeface="DejaVu Sans" panose="020B0603030804020204" pitchFamily="34" charset="0"/>
-                <a:cs typeface="DejaVu Sans" panose="020B0603030804020204" pitchFamily="34" charset="0"/>
-              </a:rPr>
-              <a:t>эффекты</a:t>
-            </a:r>
-            <a:endParaRPr lang="ru-RU" sz="3200" dirty="0">
+              <a:t>Задержки событий – разные для различных действий</a:t>
+            </a:r>
+            <a:endParaRPr lang="en-US" sz="3200" dirty="0" smtClean="0">
               <a:latin typeface="DejaVu Sans" panose="020B0603030804020204" pitchFamily="34" charset="0"/>
               <a:ea typeface="DejaVu Sans" panose="020B0603030804020204" pitchFamily="34" charset="0"/>
               <a:cs typeface="DejaVu Sans" panose="020B0603030804020204" pitchFamily="34" charset="0"/>
@@ -4484,7 +4448,7 @@
     </p:spTree>
     <p:extLst>
       <p:ext uri="{BB962C8B-B14F-4D97-AF65-F5344CB8AC3E}">
-        <p14:creationId xmlns:p14="http://schemas.microsoft.com/office/powerpoint/2010/main" val="3143689919"/>
+        <p14:creationId xmlns:p14="http://schemas.microsoft.com/office/powerpoint/2010/main" val="2383147323"/>
       </p:ext>
     </p:extLst>
   </p:cSld>
@@ -4546,7 +4510,15 @@
             </a:pPr>
             <a:r>
               <a:rPr lang="ru-RU" dirty="0" smtClean="0"/>
-              <a:t>Абстракции аппаратуры (3/3)</a:t>
+              <a:t>Разработка процессора (1</a:t>
+            </a:r>
+            <a:r>
+              <a:rPr lang="en-US" dirty="0" smtClean="0"/>
+              <a:t>/2</a:t>
+            </a:r>
+            <a:r>
+              <a:rPr lang="ru-RU" dirty="0" smtClean="0"/>
+              <a:t>)</a:t>
             </a:r>
             <a:endParaRPr lang="ru-RU" dirty="0"/>
           </a:p>
@@ -4751,16 +4723,80 @@
           </a:p>
         </p:txBody>
       </p:sp>
-      <p:sp>
-        <p:nvSpPr>
-          <p:cNvPr id="7" name="TextBox 6"/>
+      <p:pic>
+        <p:nvPicPr>
+          <p:cNvPr id="1026" name="Picture 2"/>
+          <p:cNvPicPr>
+            <a:picLocks noChangeAspect="1" noChangeArrowheads="1"/>
+          </p:cNvPicPr>
+          <p:nvPr/>
+        </p:nvPicPr>
+        <p:blipFill>
+          <a:blip r:embed="rId3">
+            <a:extLst>
+              <a:ext uri="{28A0092B-C50C-407E-A947-70E740481C1C}">
+                <a14:useLocalDpi xmlns:a14="http://schemas.microsoft.com/office/drawing/2010/main" val="0"/>
+              </a:ext>
+            </a:extLst>
+          </a:blip>
+          <a:srcRect/>
+          <a:stretch>
+            <a:fillRect/>
+          </a:stretch>
+        </p:blipFill>
+        <p:spPr bwMode="auto">
+          <a:xfrm>
+            <a:off x="611560" y="1403846"/>
+            <a:ext cx="3568511" cy="3861658"/>
+          </a:xfrm>
+          <a:prstGeom prst="rect">
+            <a:avLst/>
+          </a:prstGeom>
+          <a:noFill/>
+          <a:ln>
+            <a:noFill/>
+          </a:ln>
+          <a:effectLst/>
+          <a:extLst>
+            <a:ext uri="{909E8E84-426E-40DD-AFC4-6F175D3DCCD1}">
+              <a14:hiddenFill xmlns:a14="http://schemas.microsoft.com/office/drawing/2010/main">
+                <a:solidFill>
+                  <a:schemeClr val="accent1"/>
+                </a:solidFill>
+              </a14:hiddenFill>
+            </a:ext>
+            <a:ext uri="{91240B29-F687-4F45-9708-019B960494DF}">
+              <a14:hiddenLine xmlns:a14="http://schemas.microsoft.com/office/drawing/2010/main" w="9525">
+                <a:solidFill>
+                  <a:schemeClr val="tx1"/>
+                </a:solidFill>
+                <a:miter lim="800000"/>
+                <a:headEnd/>
+                <a:tailEnd/>
+              </a14:hiddenLine>
+            </a:ext>
+            <a:ext uri="{AF507438-7753-43E0-B8FC-AC1667EBCBE1}">
+              <a14:hiddenEffects xmlns:a14="http://schemas.microsoft.com/office/drawing/2010/main">
+                <a:effectLst>
+                  <a:outerShdw dist="35921" dir="2700000" algn="ctr" rotWithShape="0">
+                    <a:schemeClr val="bg2"/>
+                  </a:outerShdw>
+                </a:effectLst>
+              </a14:hiddenEffects>
+            </a:ext>
+          </a:extLst>
+        </p:spPr>
+      </p:pic>
+      <p:sp>
+        <p:nvSpPr>
+          <p:cNvPr id="6" name="TextBox 5"/>
           <p:cNvSpPr txBox="1"/>
           <p:nvPr/>
         </p:nvSpPr>
         <p:spPr>
           <a:xfrm>
-            <a:off x="251520" y="2210450"/>
-            <a:ext cx="8640960" cy="1569660"/>
+            <a:off x="4788024" y="1634386"/>
+            <a:ext cx="3929910" cy="2062103"/>
           </a:xfrm>
           <a:prstGeom prst="rect">
             <a:avLst/>
@@ -4789,44 +4825,73 @@
           </a:bodyPr>
           <a:lstStyle/>
           <a:p>
-            <a:pPr marL="571500" indent="-571500">
+            <a:r>
+              <a:rPr lang="ru-RU" sz="3200" dirty="0" smtClean="0">
+                <a:latin typeface="DejaVu Sans" panose="020B0603030804020204" pitchFamily="34" charset="0"/>
+                <a:ea typeface="DejaVu Sans" panose="020B0603030804020204" pitchFamily="34" charset="0"/>
+                <a:cs typeface="DejaVu Sans" panose="020B0603030804020204" pitchFamily="34" charset="0"/>
+              </a:rPr>
+              <a:t>Примеры:</a:t>
+            </a:r>
+          </a:p>
+          <a:p>
+            <a:pPr marL="457200" indent="-457200">
               <a:buFont typeface="Arial" pitchFamily="34" charset="0"/>
               <a:buChar char="•"/>
             </a:pPr>
             <a:r>
-              <a:rPr lang="ru-RU" sz="3200" dirty="0" smtClean="0">
-                <a:latin typeface="DejaVu Sans" panose="020B0603030804020204" pitchFamily="34" charset="0"/>
-                <a:ea typeface="DejaVu Sans" panose="020B0603030804020204" pitchFamily="34" charset="0"/>
-                <a:cs typeface="DejaVu Sans" panose="020B0603030804020204" pitchFamily="34" charset="0"/>
-              </a:rPr>
-              <a:t>Карты памяти</a:t>
-            </a:r>
-          </a:p>
-          <a:p>
-            <a:pPr marL="571500" indent="-571500">
+              <a:rPr lang="en-US" sz="3200" dirty="0" smtClean="0">
+                <a:latin typeface="DejaVu Sans" panose="020B0603030804020204" pitchFamily="34" charset="0"/>
+                <a:ea typeface="DejaVu Sans" panose="020B0603030804020204" pitchFamily="34" charset="0"/>
+                <a:cs typeface="DejaVu Sans" panose="020B0603030804020204" pitchFamily="34" charset="0"/>
+              </a:rPr>
+              <a:t>LISA</a:t>
+            </a:r>
+          </a:p>
+          <a:p>
+            <a:pPr marL="457200" indent="-457200">
               <a:buFont typeface="Arial" pitchFamily="34" charset="0"/>
               <a:buChar char="•"/>
             </a:pPr>
             <a:r>
-              <a:rPr lang="ru-RU" sz="3200" dirty="0" smtClean="0">
-                <a:latin typeface="DejaVu Sans" panose="020B0603030804020204" pitchFamily="34" charset="0"/>
-                <a:ea typeface="DejaVu Sans" panose="020B0603030804020204" pitchFamily="34" charset="0"/>
-                <a:cs typeface="DejaVu Sans" panose="020B0603030804020204" pitchFamily="34" charset="0"/>
-              </a:rPr>
-              <a:t>Задержки событий – разные для различных действий</a:t>
-            </a:r>
-            <a:endParaRPr lang="en-US" sz="3200" dirty="0" smtClean="0">
+              <a:rPr lang="en-US" sz="3200" dirty="0" smtClean="0">
+                <a:latin typeface="DejaVu Sans" panose="020B0603030804020204" pitchFamily="34" charset="0"/>
+                <a:ea typeface="DejaVu Sans" panose="020B0603030804020204" pitchFamily="34" charset="0"/>
+                <a:cs typeface="DejaVu Sans" panose="020B0603030804020204" pitchFamily="34" charset="0"/>
+              </a:rPr>
+              <a:t>ISDL</a:t>
+            </a:r>
+            <a:endParaRPr lang="ru-RU" sz="3200" dirty="0" smtClean="0">
               <a:latin typeface="DejaVu Sans" panose="020B0603030804020204" pitchFamily="34" charset="0"/>
               <a:ea typeface="DejaVu Sans" panose="020B0603030804020204" pitchFamily="34" charset="0"/>
               <a:cs typeface="DejaVu Sans" panose="020B0603030804020204" pitchFamily="34" charset="0"/>
             </a:endParaRPr>
           </a:p>
+          <a:p>
+            <a:pPr marL="457200" indent="-457200">
+              <a:buFont typeface="Arial" pitchFamily="34" charset="0"/>
+              <a:buChar char="•"/>
+            </a:pPr>
+            <a:r>
+              <a:rPr lang="en-US" sz="3200" dirty="0" err="1" smtClean="0">
+                <a:latin typeface="DejaVu Sans" panose="020B0603030804020204" pitchFamily="34" charset="0"/>
+                <a:ea typeface="DejaVu Sans" panose="020B0603030804020204" pitchFamily="34" charset="0"/>
+                <a:cs typeface="DejaVu Sans" panose="020B0603030804020204" pitchFamily="34" charset="0"/>
+              </a:rPr>
+              <a:t>SimGen</a:t>
+            </a:r>
+            <a:endParaRPr lang="ru-RU" sz="3200" dirty="0">
+              <a:latin typeface="DejaVu Sans" panose="020B0603030804020204" pitchFamily="34" charset="0"/>
+              <a:ea typeface="DejaVu Sans" panose="020B0603030804020204" pitchFamily="34" charset="0"/>
+              <a:cs typeface="DejaVu Sans" panose="020B0603030804020204" pitchFamily="34" charset="0"/>
+            </a:endParaRPr>
+          </a:p>
         </p:txBody>
       </p:sp>
     </p:spTree>
     <p:extLst>
       <p:ext uri="{BB962C8B-B14F-4D97-AF65-F5344CB8AC3E}">
-        <p14:creationId xmlns:p14="http://schemas.microsoft.com/office/powerpoint/2010/main" val="2383147323"/>
+        <p14:creationId xmlns:p14="http://schemas.microsoft.com/office/powerpoint/2010/main" val="1335870776"/>
       </p:ext>
     </p:extLst>
   </p:cSld>
@@ -4870,8 +4935,8 @@
       </p:grpSpPr>
       <p:sp>
         <p:nvSpPr>
-          <p:cNvPr id="2" name="Title 1"/>
-          <p:cNvSpPr txBox="1">
+          <p:cNvPr id="6" name="Title 5"/>
+          <p:cNvSpPr>
             <a:spLocks noGrp="1"/>
           </p:cNvSpPr>
           <p:nvPr>
@@ -4883,28 +4948,230 @@
           <a:bodyPr/>
           <a:lstStyle/>
           <a:p>
-            <a:pPr lvl="0">
+            <a:pPr>
               <a:buNone/>
             </a:pPr>
             <a:r>
+              <a:rPr lang="ru-RU" dirty="0"/>
+              <a:t>Разработка процессора </a:t>
+            </a:r>
+            <a:r>
               <a:rPr lang="ru-RU" dirty="0" smtClean="0"/>
-              <a:t>Разработка процессора (1</a:t>
+              <a:t>(</a:t>
             </a:r>
             <a:r>
               <a:rPr lang="en-US" dirty="0" smtClean="0"/>
-              <a:t>/2</a:t>
-            </a:r>
-            <a:r>
-              <a:rPr lang="ru-RU" dirty="0" smtClean="0"/>
+              <a:t>2/2</a:t>
+            </a:r>
+            <a:r>
+              <a:rPr lang="ru-RU" dirty="0"/>
               <a:t>)</a:t>
             </a:r>
-            <a:endParaRPr lang="ru-RU" dirty="0"/>
-          </a:p>
-        </p:txBody>
-      </p:sp>
-      <p:sp>
-        <p:nvSpPr>
-          <p:cNvPr id="3" name="Date Placeholder 2"/>
+          </a:p>
+        </p:txBody>
+      </p:sp>
+      <p:sp>
+        <p:nvSpPr>
+          <p:cNvPr id="8" name="TextBox 7"/>
+          <p:cNvSpPr txBox="1"/>
+          <p:nvPr/>
+        </p:nvSpPr>
+        <p:spPr>
+          <a:xfrm>
+            <a:off x="395536" y="1043806"/>
+            <a:ext cx="4032448" cy="3108543"/>
+          </a:xfrm>
+          <a:prstGeom prst="rect">
+            <a:avLst/>
+          </a:prstGeom>
+          <a:ln>
+            <a:noFill/>
+          </a:ln>
+        </p:spPr>
+        <p:style>
+          <a:lnRef idx="2">
+            <a:schemeClr val="dk1"/>
+          </a:lnRef>
+          <a:fillRef idx="1">
+            <a:schemeClr val="lt1"/>
+          </a:fillRef>
+          <a:effectRef idx="0">
+            <a:schemeClr val="dk1"/>
+          </a:effectRef>
+          <a:fontRef idx="minor">
+            <a:schemeClr val="dk1"/>
+          </a:fontRef>
+        </p:style>
+        <p:txBody>
+          <a:bodyPr wrap="square" rtlCol="0">
+            <a:spAutoFit/>
+          </a:bodyPr>
+          <a:lstStyle/>
+          <a:p>
+            <a:r>
+              <a:rPr lang="ru-RU" sz="2800" dirty="0" smtClean="0">
+                <a:latin typeface="DejaVu Sans" panose="020B0603030804020204" pitchFamily="34" charset="0"/>
+                <a:ea typeface="DejaVu Sans" panose="020B0603030804020204" pitchFamily="34" charset="0"/>
+                <a:cs typeface="DejaVu Sans" panose="020B0603030804020204" pitchFamily="34" charset="0"/>
+              </a:rPr>
+              <a:t>Недостатки:</a:t>
+            </a:r>
+          </a:p>
+          <a:p>
+            <a:pPr marL="571500" indent="-571500">
+              <a:buFont typeface="Arial" pitchFamily="34" charset="0"/>
+              <a:buChar char="•"/>
+            </a:pPr>
+            <a:r>
+              <a:rPr lang="ru-RU" sz="2400" dirty="0">
+                <a:latin typeface="DejaVu Sans" panose="020B0603030804020204" pitchFamily="34" charset="0"/>
+                <a:ea typeface="DejaVu Sans" panose="020B0603030804020204" pitchFamily="34" charset="0"/>
+                <a:cs typeface="DejaVu Sans" panose="020B0603030804020204" pitchFamily="34" charset="0"/>
+              </a:rPr>
+              <a:t>Генерируется не самый быстрый код</a:t>
+            </a:r>
+          </a:p>
+          <a:p>
+            <a:pPr marL="571500" indent="-571500">
+              <a:buFont typeface="Arial" pitchFamily="34" charset="0"/>
+              <a:buChar char="•"/>
+            </a:pPr>
+            <a:r>
+              <a:rPr lang="ru-RU" sz="2400" dirty="0">
+                <a:latin typeface="DejaVu Sans" panose="020B0603030804020204" pitchFamily="34" charset="0"/>
+                <a:ea typeface="DejaVu Sans" panose="020B0603030804020204" pitchFamily="34" charset="0"/>
+                <a:cs typeface="DejaVu Sans" panose="020B0603030804020204" pitchFamily="34" charset="0"/>
+              </a:rPr>
+              <a:t>Код может быть не компактен</a:t>
+            </a:r>
+          </a:p>
+          <a:p>
+            <a:pPr marL="571500" indent="-571500">
+              <a:buFont typeface="Arial" pitchFamily="34" charset="0"/>
+              <a:buChar char="•"/>
+            </a:pPr>
+            <a:r>
+              <a:rPr lang="ru-RU" sz="2400" dirty="0">
+                <a:latin typeface="DejaVu Sans" panose="020B0603030804020204" pitchFamily="34" charset="0"/>
+                <a:ea typeface="DejaVu Sans" panose="020B0603030804020204" pitchFamily="34" charset="0"/>
+                <a:cs typeface="DejaVu Sans" panose="020B0603030804020204" pitchFamily="34" charset="0"/>
+              </a:rPr>
+              <a:t>Модель может работать </a:t>
+            </a:r>
+            <a:r>
+              <a:rPr lang="ru-RU" sz="2400" dirty="0" smtClean="0">
+                <a:latin typeface="DejaVu Sans" panose="020B0603030804020204" pitchFamily="34" charset="0"/>
+                <a:ea typeface="DejaVu Sans" panose="020B0603030804020204" pitchFamily="34" charset="0"/>
+                <a:cs typeface="DejaVu Sans" panose="020B0603030804020204" pitchFamily="34" charset="0"/>
+              </a:rPr>
+              <a:t>медленнее</a:t>
+            </a:r>
+            <a:endParaRPr lang="en-US" sz="2400" dirty="0">
+              <a:latin typeface="DejaVu Sans" panose="020B0603030804020204" pitchFamily="34" charset="0"/>
+              <a:ea typeface="DejaVu Sans" panose="020B0603030804020204" pitchFamily="34" charset="0"/>
+              <a:cs typeface="DejaVu Sans" panose="020B0603030804020204" pitchFamily="34" charset="0"/>
+            </a:endParaRPr>
+          </a:p>
+        </p:txBody>
+      </p:sp>
+      <p:sp>
+        <p:nvSpPr>
+          <p:cNvPr id="10" name="TextBox 9"/>
+          <p:cNvSpPr txBox="1"/>
+          <p:nvPr/>
+        </p:nvSpPr>
+        <p:spPr>
+          <a:xfrm>
+            <a:off x="4685486" y="1055364"/>
+            <a:ext cx="4032448" cy="2246769"/>
+          </a:xfrm>
+          <a:prstGeom prst="rect">
+            <a:avLst/>
+          </a:prstGeom>
+          <a:ln>
+            <a:noFill/>
+          </a:ln>
+        </p:spPr>
+        <p:style>
+          <a:lnRef idx="2">
+            <a:schemeClr val="dk1"/>
+          </a:lnRef>
+          <a:fillRef idx="1">
+            <a:schemeClr val="lt1"/>
+          </a:fillRef>
+          <a:effectRef idx="0">
+            <a:schemeClr val="dk1"/>
+          </a:effectRef>
+          <a:fontRef idx="minor">
+            <a:schemeClr val="dk1"/>
+          </a:fontRef>
+        </p:style>
+        <p:txBody>
+          <a:bodyPr wrap="square" rtlCol="0">
+            <a:spAutoFit/>
+          </a:bodyPr>
+          <a:lstStyle/>
+          <a:p>
+            <a:r>
+              <a:rPr lang="ru-RU" sz="2800" dirty="0" smtClean="0">
+                <a:latin typeface="DejaVu Sans" panose="020B0603030804020204" pitchFamily="34" charset="0"/>
+                <a:ea typeface="DejaVu Sans" panose="020B0603030804020204" pitchFamily="34" charset="0"/>
+                <a:cs typeface="DejaVu Sans" panose="020B0603030804020204" pitchFamily="34" charset="0"/>
+              </a:rPr>
+              <a:t>Преимущества:</a:t>
+            </a:r>
+          </a:p>
+          <a:p>
+            <a:pPr marL="457200" indent="-457200">
+              <a:buFont typeface="Arial" pitchFamily="34" charset="0"/>
+              <a:buChar char="•"/>
+            </a:pPr>
+            <a:r>
+              <a:rPr lang="ru-RU" sz="2800" dirty="0">
+                <a:latin typeface="DejaVu Sans" panose="020B0603030804020204" pitchFamily="34" charset="0"/>
+                <a:ea typeface="DejaVu Sans" panose="020B0603030804020204" pitchFamily="34" charset="0"/>
+                <a:cs typeface="DejaVu Sans" panose="020B0603030804020204" pitchFamily="34" charset="0"/>
+              </a:rPr>
+              <a:t>Скорость создания</a:t>
+            </a:r>
+            <a:r>
+              <a:rPr lang="ru-RU" sz="2800" dirty="0" smtClean="0">
+                <a:latin typeface="DejaVu Sans" panose="020B0603030804020204" pitchFamily="34" charset="0"/>
+                <a:ea typeface="DejaVu Sans" panose="020B0603030804020204" pitchFamily="34" charset="0"/>
+                <a:cs typeface="DejaVu Sans" panose="020B0603030804020204" pitchFamily="34" charset="0"/>
+              </a:rPr>
+              <a:t>/ модификации</a:t>
+            </a:r>
+            <a:endParaRPr lang="ru-RU" sz="2800" dirty="0">
+              <a:latin typeface="DejaVu Sans" panose="020B0603030804020204" pitchFamily="34" charset="0"/>
+              <a:ea typeface="DejaVu Sans" panose="020B0603030804020204" pitchFamily="34" charset="0"/>
+              <a:cs typeface="DejaVu Sans" panose="020B0603030804020204" pitchFamily="34" charset="0"/>
+            </a:endParaRPr>
+          </a:p>
+          <a:p>
+            <a:pPr marL="457200" indent="-457200">
+              <a:buFont typeface="Arial" pitchFamily="34" charset="0"/>
+              <a:buChar char="•"/>
+            </a:pPr>
+            <a:r>
+              <a:rPr lang="ru-RU" sz="2800" dirty="0" smtClean="0">
+                <a:latin typeface="DejaVu Sans" panose="020B0603030804020204" pitchFamily="34" charset="0"/>
+                <a:ea typeface="DejaVu Sans" panose="020B0603030804020204" pitchFamily="34" charset="0"/>
+                <a:cs typeface="DejaVu Sans" panose="020B0603030804020204" pitchFamily="34" charset="0"/>
+              </a:rPr>
+              <a:t>Согласованность</a:t>
+            </a:r>
+            <a:endParaRPr lang="en-US" sz="2800" dirty="0">
+              <a:latin typeface="DejaVu Sans" panose="020B0603030804020204" pitchFamily="34" charset="0"/>
+              <a:ea typeface="DejaVu Sans" panose="020B0603030804020204" pitchFamily="34" charset="0"/>
+              <a:cs typeface="DejaVu Sans" panose="020B0603030804020204" pitchFamily="34" charset="0"/>
+            </a:endParaRPr>
+          </a:p>
+        </p:txBody>
+      </p:sp>
+      <p:sp>
+        <p:nvSpPr>
+          <p:cNvPr id="11" name="Date Placeholder 2"/>
           <p:cNvSpPr txBox="1"/>
           <p:nvPr/>
         </p:nvSpPr>
@@ -4989,7 +5256,7 @@
       </p:sp>
       <p:sp>
         <p:nvSpPr>
-          <p:cNvPr id="4" name="Footer Placeholder 3"/>
+          <p:cNvPr id="12" name="Footer Placeholder 3"/>
           <p:cNvSpPr txBox="1"/>
           <p:nvPr/>
         </p:nvSpPr>
@@ -5046,7 +5313,7 @@
       </p:sp>
       <p:sp>
         <p:nvSpPr>
-          <p:cNvPr id="5" name="Slide Number Placeholder 4"/>
+          <p:cNvPr id="13" name="Slide Number Placeholder 4"/>
           <p:cNvSpPr txBox="1"/>
           <p:nvPr/>
         </p:nvSpPr>
@@ -5101,175 +5368,10 @@
           </a:p>
         </p:txBody>
       </p:sp>
-      <p:pic>
-        <p:nvPicPr>
-          <p:cNvPr id="1026" name="Picture 2"/>
-          <p:cNvPicPr>
-            <a:picLocks noChangeAspect="1" noChangeArrowheads="1"/>
-          </p:cNvPicPr>
-          <p:nvPr/>
-        </p:nvPicPr>
-        <p:blipFill>
-          <a:blip r:embed="rId3">
-            <a:extLst>
-              <a:ext uri="{28A0092B-C50C-407E-A947-70E740481C1C}">
-                <a14:useLocalDpi xmlns:a14="http://schemas.microsoft.com/office/drawing/2010/main" val="0"/>
-              </a:ext>
-            </a:extLst>
-          </a:blip>
-          <a:srcRect/>
-          <a:stretch>
-            <a:fillRect/>
-          </a:stretch>
-        </p:blipFill>
-        <p:spPr bwMode="auto">
-          <a:xfrm>
-            <a:off x="611560" y="1403846"/>
-            <a:ext cx="3568511" cy="3861658"/>
-          </a:xfrm>
-          <a:prstGeom prst="rect">
-            <a:avLst/>
-          </a:prstGeom>
-          <a:noFill/>
-          <a:ln>
-            <a:noFill/>
-          </a:ln>
-          <a:effectLst/>
-          <a:extLst>
-            <a:ext uri="{909E8E84-426E-40DD-AFC4-6F175D3DCCD1}">
-              <a14:hiddenFill xmlns:a14="http://schemas.microsoft.com/office/drawing/2010/main">
-                <a:solidFill>
-                  <a:schemeClr val="accent1"/>
-                </a:solidFill>
-              </a14:hiddenFill>
-            </a:ext>
-            <a:ext uri="{91240B29-F687-4F45-9708-019B960494DF}">
-              <a14:hiddenLine xmlns:a14="http://schemas.microsoft.com/office/drawing/2010/main" w="9525">
-                <a:solidFill>
-                  <a:schemeClr val="tx1"/>
-                </a:solidFill>
-                <a:miter lim="800000"/>
-                <a:headEnd/>
-                <a:tailEnd/>
-              </a14:hiddenLine>
-            </a:ext>
-            <a:ext uri="{AF507438-7753-43E0-B8FC-AC1667EBCBE1}">
-              <a14:hiddenEffects xmlns:a14="http://schemas.microsoft.com/office/drawing/2010/main">
-                <a:effectLst>
-                  <a:outerShdw dist="35921" dir="2700000" algn="ctr" rotWithShape="0">
-                    <a:schemeClr val="bg2"/>
-                  </a:outerShdw>
-                </a:effectLst>
-              </a14:hiddenEffects>
-            </a:ext>
-          </a:extLst>
-        </p:spPr>
-      </p:pic>
-      <p:sp>
-        <p:nvSpPr>
-          <p:cNvPr id="6" name="TextBox 5"/>
-          <p:cNvSpPr txBox="1"/>
-          <p:nvPr/>
-        </p:nvSpPr>
-        <p:spPr>
-          <a:xfrm>
-            <a:off x="4788024" y="1634386"/>
-            <a:ext cx="3929910" cy="2062103"/>
-          </a:xfrm>
-          <a:prstGeom prst="rect">
-            <a:avLst/>
-          </a:prstGeom>
-          <a:ln>
-            <a:noFill/>
-          </a:ln>
-        </p:spPr>
-        <p:style>
-          <a:lnRef idx="2">
-            <a:schemeClr val="dk1"/>
-          </a:lnRef>
-          <a:fillRef idx="1">
-            <a:schemeClr val="lt1"/>
-          </a:fillRef>
-          <a:effectRef idx="0">
-            <a:schemeClr val="dk1"/>
-          </a:effectRef>
-          <a:fontRef idx="minor">
-            <a:schemeClr val="dk1"/>
-          </a:fontRef>
-        </p:style>
-        <p:txBody>
-          <a:bodyPr wrap="square" rtlCol="0">
-            <a:spAutoFit/>
-          </a:bodyPr>
-          <a:lstStyle/>
-          <a:p>
-            <a:r>
-              <a:rPr lang="ru-RU" sz="3200" dirty="0" smtClean="0">
-                <a:latin typeface="DejaVu Sans" panose="020B0603030804020204" pitchFamily="34" charset="0"/>
-                <a:ea typeface="DejaVu Sans" panose="020B0603030804020204" pitchFamily="34" charset="0"/>
-                <a:cs typeface="DejaVu Sans" panose="020B0603030804020204" pitchFamily="34" charset="0"/>
-              </a:rPr>
-              <a:t>Примеры:</a:t>
-            </a:r>
-          </a:p>
-          <a:p>
-            <a:pPr marL="457200" indent="-457200">
-              <a:buFont typeface="Arial" pitchFamily="34" charset="0"/>
-              <a:buChar char="•"/>
-            </a:pPr>
-            <a:r>
-              <a:rPr lang="en-US" sz="3200" dirty="0" smtClean="0">
-                <a:latin typeface="DejaVu Sans" panose="020B0603030804020204" pitchFamily="34" charset="0"/>
-                <a:ea typeface="DejaVu Sans" panose="020B0603030804020204" pitchFamily="34" charset="0"/>
-                <a:cs typeface="DejaVu Sans" panose="020B0603030804020204" pitchFamily="34" charset="0"/>
-              </a:rPr>
-              <a:t>LISA</a:t>
-            </a:r>
-          </a:p>
-          <a:p>
-            <a:pPr marL="457200" indent="-457200">
-              <a:buFont typeface="Arial" pitchFamily="34" charset="0"/>
-              <a:buChar char="•"/>
-            </a:pPr>
-            <a:r>
-              <a:rPr lang="en-US" sz="3200" dirty="0" smtClean="0">
-                <a:latin typeface="DejaVu Sans" panose="020B0603030804020204" pitchFamily="34" charset="0"/>
-                <a:ea typeface="DejaVu Sans" panose="020B0603030804020204" pitchFamily="34" charset="0"/>
-                <a:cs typeface="DejaVu Sans" panose="020B0603030804020204" pitchFamily="34" charset="0"/>
-              </a:rPr>
-              <a:t>ISDL</a:t>
-            </a:r>
-            <a:endParaRPr lang="ru-RU" sz="3200" dirty="0" smtClean="0">
-              <a:latin typeface="DejaVu Sans" panose="020B0603030804020204" pitchFamily="34" charset="0"/>
-              <a:ea typeface="DejaVu Sans" panose="020B0603030804020204" pitchFamily="34" charset="0"/>
-              <a:cs typeface="DejaVu Sans" panose="020B0603030804020204" pitchFamily="34" charset="0"/>
-            </a:endParaRPr>
-          </a:p>
-          <a:p>
-            <a:pPr marL="457200" indent="-457200">
-              <a:buFont typeface="Arial" pitchFamily="34" charset="0"/>
-              <a:buChar char="•"/>
-            </a:pPr>
-            <a:r>
-              <a:rPr lang="en-US" sz="3200" dirty="0" err="1" smtClean="0">
-                <a:latin typeface="DejaVu Sans" panose="020B0603030804020204" pitchFamily="34" charset="0"/>
-                <a:ea typeface="DejaVu Sans" panose="020B0603030804020204" pitchFamily="34" charset="0"/>
-                <a:cs typeface="DejaVu Sans" panose="020B0603030804020204" pitchFamily="34" charset="0"/>
-              </a:rPr>
-              <a:t>SimGen</a:t>
-            </a:r>
-            <a:endParaRPr lang="ru-RU" sz="3200" dirty="0">
-              <a:latin typeface="DejaVu Sans" panose="020B0603030804020204" pitchFamily="34" charset="0"/>
-              <a:ea typeface="DejaVu Sans" panose="020B0603030804020204" pitchFamily="34" charset="0"/>
-              <a:cs typeface="DejaVu Sans" panose="020B0603030804020204" pitchFamily="34" charset="0"/>
-            </a:endParaRPr>
-          </a:p>
-        </p:txBody>
-      </p:sp>
     </p:spTree>
     <p:extLst>
       <p:ext uri="{BB962C8B-B14F-4D97-AF65-F5344CB8AC3E}">
-        <p14:creationId xmlns:p14="http://schemas.microsoft.com/office/powerpoint/2010/main" val="1335870776"/>
+        <p14:creationId xmlns:p14="http://schemas.microsoft.com/office/powerpoint/2010/main" val="2726653295"/>
       </p:ext>
     </p:extLst>
   </p:cSld>
@@ -5330,220 +5432,10 @@
               <a:buNone/>
             </a:pPr>
             <a:r>
-              <a:rPr lang="ru-RU" dirty="0"/>
-              <a:t>Разработка процессора </a:t>
-            </a:r>
-            <a:r>
-              <a:rPr lang="ru-RU" dirty="0" smtClean="0"/>
-              <a:t>(</a:t>
-            </a:r>
-            <a:r>
               <a:rPr lang="en-US" dirty="0" smtClean="0"/>
-              <a:t>2/2</a:t>
-            </a:r>
-            <a:r>
-              <a:rPr lang="ru-RU" dirty="0"/>
-              <a:t>)</a:t>
-            </a:r>
-          </a:p>
-        </p:txBody>
-      </p:sp>
-      <p:sp>
-        <p:nvSpPr>
-          <p:cNvPr id="8" name="TextBox 7"/>
-          <p:cNvSpPr txBox="1"/>
-          <p:nvPr/>
-        </p:nvSpPr>
-        <p:spPr>
-          <a:xfrm>
-            <a:off x="395536" y="1043806"/>
-            <a:ext cx="4032448" cy="3108543"/>
-          </a:xfrm>
-          <a:prstGeom prst="rect">
-            <a:avLst/>
-          </a:prstGeom>
-          <a:ln>
-            <a:noFill/>
-          </a:ln>
-        </p:spPr>
-        <p:style>
-          <a:lnRef idx="2">
-            <a:schemeClr val="dk1"/>
-          </a:lnRef>
-          <a:fillRef idx="1">
-            <a:schemeClr val="lt1"/>
-          </a:fillRef>
-          <a:effectRef idx="0">
-            <a:schemeClr val="dk1"/>
-          </a:effectRef>
-          <a:fontRef idx="minor">
-            <a:schemeClr val="dk1"/>
-          </a:fontRef>
-        </p:style>
-        <p:txBody>
-          <a:bodyPr wrap="square" rtlCol="0">
-            <a:spAutoFit/>
-          </a:bodyPr>
-          <a:lstStyle/>
-          <a:p>
-            <a:r>
-              <a:rPr lang="ru-RU" sz="2800" dirty="0" smtClean="0">
-                <a:latin typeface="DejaVu Sans" panose="020B0603030804020204" pitchFamily="34" charset="0"/>
-                <a:ea typeface="DejaVu Sans" panose="020B0603030804020204" pitchFamily="34" charset="0"/>
-                <a:cs typeface="DejaVu Sans" panose="020B0603030804020204" pitchFamily="34" charset="0"/>
-              </a:rPr>
-              <a:t>Недостатки:</a:t>
-            </a:r>
-          </a:p>
-          <a:p>
-            <a:pPr marL="571500" indent="-571500">
-              <a:buFont typeface="Arial" pitchFamily="34" charset="0"/>
-              <a:buChar char="•"/>
-            </a:pPr>
-            <a:r>
-              <a:rPr lang="ru-RU" sz="2400" dirty="0">
-                <a:latin typeface="DejaVu Sans" panose="020B0603030804020204" pitchFamily="34" charset="0"/>
-                <a:ea typeface="DejaVu Sans" panose="020B0603030804020204" pitchFamily="34" charset="0"/>
-                <a:cs typeface="DejaVu Sans" panose="020B0603030804020204" pitchFamily="34" charset="0"/>
-              </a:rPr>
-              <a:t>Генерируется не самый быстрый код</a:t>
-            </a:r>
-          </a:p>
-          <a:p>
-            <a:pPr marL="571500" indent="-571500">
-              <a:buFont typeface="Arial" pitchFamily="34" charset="0"/>
-              <a:buChar char="•"/>
-            </a:pPr>
-            <a:r>
-              <a:rPr lang="ru-RU" sz="2400" dirty="0">
-                <a:latin typeface="DejaVu Sans" panose="020B0603030804020204" pitchFamily="34" charset="0"/>
-                <a:ea typeface="DejaVu Sans" panose="020B0603030804020204" pitchFamily="34" charset="0"/>
-                <a:cs typeface="DejaVu Sans" panose="020B0603030804020204" pitchFamily="34" charset="0"/>
-              </a:rPr>
-              <a:t>Код может быть не компактен</a:t>
-            </a:r>
-          </a:p>
-          <a:p>
-            <a:pPr marL="571500" indent="-571500">
-              <a:buFont typeface="Arial" pitchFamily="34" charset="0"/>
-              <a:buChar char="•"/>
-            </a:pPr>
-            <a:r>
-              <a:rPr lang="ru-RU" sz="2400" dirty="0">
-                <a:latin typeface="DejaVu Sans" panose="020B0603030804020204" pitchFamily="34" charset="0"/>
-                <a:ea typeface="DejaVu Sans" panose="020B0603030804020204" pitchFamily="34" charset="0"/>
-                <a:cs typeface="DejaVu Sans" panose="020B0603030804020204" pitchFamily="34" charset="0"/>
-              </a:rPr>
-              <a:t>Модель может работать </a:t>
-            </a:r>
-            <a:r>
-              <a:rPr lang="ru-RU" sz="2400" dirty="0" smtClean="0">
-                <a:latin typeface="DejaVu Sans" panose="020B0603030804020204" pitchFamily="34" charset="0"/>
-                <a:ea typeface="DejaVu Sans" panose="020B0603030804020204" pitchFamily="34" charset="0"/>
-                <a:cs typeface="DejaVu Sans" panose="020B0603030804020204" pitchFamily="34" charset="0"/>
-              </a:rPr>
-              <a:t>медленнее</a:t>
-            </a:r>
-            <a:endParaRPr lang="en-US" sz="2400" dirty="0">
-              <a:latin typeface="DejaVu Sans" panose="020B0603030804020204" pitchFamily="34" charset="0"/>
-              <a:ea typeface="DejaVu Sans" panose="020B0603030804020204" pitchFamily="34" charset="0"/>
-              <a:cs typeface="DejaVu Sans" panose="020B0603030804020204" pitchFamily="34" charset="0"/>
-            </a:endParaRPr>
-          </a:p>
-        </p:txBody>
-      </p:sp>
-      <p:sp>
-        <p:nvSpPr>
-          <p:cNvPr id="10" name="TextBox 9"/>
-          <p:cNvSpPr txBox="1"/>
-          <p:nvPr/>
-        </p:nvSpPr>
-        <p:spPr>
-          <a:xfrm>
-            <a:off x="4685486" y="1055364"/>
-            <a:ext cx="4032448" cy="2246769"/>
-          </a:xfrm>
-          <a:prstGeom prst="rect">
-            <a:avLst/>
-          </a:prstGeom>
-          <a:ln>
-            <a:noFill/>
-          </a:ln>
-        </p:spPr>
-        <p:style>
-          <a:lnRef idx="2">
-            <a:schemeClr val="dk1"/>
-          </a:lnRef>
-          <a:fillRef idx="1">
-            <a:schemeClr val="lt1"/>
-          </a:fillRef>
-          <a:effectRef idx="0">
-            <a:schemeClr val="dk1"/>
-          </a:effectRef>
-          <a:fontRef idx="minor">
-            <a:schemeClr val="dk1"/>
-          </a:fontRef>
-        </p:style>
-        <p:txBody>
-          <a:bodyPr wrap="square" rtlCol="0">
-            <a:spAutoFit/>
-          </a:bodyPr>
-          <a:lstStyle/>
-          <a:p>
-            <a:r>
-              <a:rPr lang="ru-RU" sz="2800" dirty="0" smtClean="0">
-                <a:latin typeface="DejaVu Sans" panose="020B0603030804020204" pitchFamily="34" charset="0"/>
-                <a:ea typeface="DejaVu Sans" panose="020B0603030804020204" pitchFamily="34" charset="0"/>
-                <a:cs typeface="DejaVu Sans" panose="020B0603030804020204" pitchFamily="34" charset="0"/>
-              </a:rPr>
-              <a:t>Преимущества:</a:t>
-            </a:r>
-          </a:p>
-          <a:p>
-            <a:pPr marL="457200" indent="-457200">
-              <a:buFont typeface="Arial" pitchFamily="34" charset="0"/>
-              <a:buChar char="•"/>
-            </a:pPr>
-            <a:r>
-              <a:rPr lang="ru-RU" sz="2800" dirty="0">
-                <a:latin typeface="DejaVu Sans" panose="020B0603030804020204" pitchFamily="34" charset="0"/>
-                <a:ea typeface="DejaVu Sans" panose="020B0603030804020204" pitchFamily="34" charset="0"/>
-                <a:cs typeface="DejaVu Sans" panose="020B0603030804020204" pitchFamily="34" charset="0"/>
-              </a:rPr>
-              <a:t>Скорость создания</a:t>
-            </a:r>
-            <a:r>
-              <a:rPr lang="ru-RU" sz="2800" dirty="0" smtClean="0">
-                <a:latin typeface="DejaVu Sans" panose="020B0603030804020204" pitchFamily="34" charset="0"/>
-                <a:ea typeface="DejaVu Sans" panose="020B0603030804020204" pitchFamily="34" charset="0"/>
-                <a:cs typeface="DejaVu Sans" panose="020B0603030804020204" pitchFamily="34" charset="0"/>
-              </a:rPr>
-              <a:t>/ модификации</a:t>
-            </a:r>
-            <a:endParaRPr lang="ru-RU" sz="2800" dirty="0">
-              <a:latin typeface="DejaVu Sans" panose="020B0603030804020204" pitchFamily="34" charset="0"/>
-              <a:ea typeface="DejaVu Sans" panose="020B0603030804020204" pitchFamily="34" charset="0"/>
-              <a:cs typeface="DejaVu Sans" panose="020B0603030804020204" pitchFamily="34" charset="0"/>
-            </a:endParaRPr>
-          </a:p>
-          <a:p>
-            <a:pPr marL="457200" indent="-457200">
-              <a:buFont typeface="Arial" pitchFamily="34" charset="0"/>
-              <a:buChar char="•"/>
-            </a:pPr>
-            <a:r>
-              <a:rPr lang="ru-RU" sz="2800" dirty="0" smtClean="0">
-                <a:latin typeface="DejaVu Sans" panose="020B0603030804020204" pitchFamily="34" charset="0"/>
-                <a:ea typeface="DejaVu Sans" panose="020B0603030804020204" pitchFamily="34" charset="0"/>
-                <a:cs typeface="DejaVu Sans" panose="020B0603030804020204" pitchFamily="34" charset="0"/>
-              </a:rPr>
-              <a:t>Согласованность</a:t>
-            </a:r>
-            <a:endParaRPr lang="en-US" sz="2800" dirty="0">
-              <a:latin typeface="DejaVu Sans" panose="020B0603030804020204" pitchFamily="34" charset="0"/>
-              <a:ea typeface="DejaVu Sans" panose="020B0603030804020204" pitchFamily="34" charset="0"/>
-              <a:cs typeface="DejaVu Sans" panose="020B0603030804020204" pitchFamily="34" charset="0"/>
-            </a:endParaRPr>
+              <a:t>Verilog</a:t>
+            </a:r>
+            <a:endParaRPr lang="ru-RU" dirty="0"/>
           </a:p>
         </p:txBody>
       </p:sp>
@@ -5746,10 +5638,340 @@
           </a:p>
         </p:txBody>
       </p:sp>
+      <p:sp>
+        <p:nvSpPr>
+          <p:cNvPr id="2" name="TextBox 1"/>
+          <p:cNvSpPr txBox="1"/>
+          <p:nvPr/>
+        </p:nvSpPr>
+        <p:spPr>
+          <a:xfrm>
+            <a:off x="179512" y="1116138"/>
+            <a:ext cx="8640960" cy="3785652"/>
+          </a:xfrm>
+          <a:prstGeom prst="rect">
+            <a:avLst/>
+          </a:prstGeom>
+          <a:ln>
+            <a:solidFill>
+              <a:schemeClr val="bg1"/>
+            </a:solidFill>
+          </a:ln>
+        </p:spPr>
+        <p:style>
+          <a:lnRef idx="2">
+            <a:schemeClr val="dk1"/>
+          </a:lnRef>
+          <a:fillRef idx="1">
+            <a:schemeClr val="lt1"/>
+          </a:fillRef>
+          <a:effectRef idx="0">
+            <a:schemeClr val="dk1"/>
+          </a:effectRef>
+          <a:fontRef idx="minor">
+            <a:schemeClr val="dk1"/>
+          </a:fontRef>
+        </p:style>
+        <p:txBody>
+          <a:bodyPr wrap="square" rtlCol="0">
+            <a:spAutoFit/>
+          </a:bodyPr>
+          <a:lstStyle/>
+          <a:p>
+            <a:r>
+              <a:rPr lang="en-US" sz="2400" dirty="0" smtClean="0">
+                <a:latin typeface="DejaVu Sans" panose="020B0603030804020204" pitchFamily="34" charset="0"/>
+                <a:ea typeface="DejaVu Sans" panose="020B0603030804020204" pitchFamily="34" charset="0"/>
+                <a:cs typeface="DejaVu Sans" panose="020B0603030804020204" pitchFamily="34" charset="0"/>
+              </a:rPr>
+              <a:t>Phil </a:t>
+            </a:r>
+            <a:r>
+              <a:rPr lang="en-US" sz="2400" dirty="0" err="1" smtClean="0">
+                <a:latin typeface="DejaVu Sans" panose="020B0603030804020204" pitchFamily="34" charset="0"/>
+                <a:ea typeface="DejaVu Sans" panose="020B0603030804020204" pitchFamily="34" charset="0"/>
+                <a:cs typeface="DejaVu Sans" panose="020B0603030804020204" pitchFamily="34" charset="0"/>
+              </a:rPr>
+              <a:t>Moorby</a:t>
+            </a:r>
+            <a:r>
+              <a:rPr lang="ru-RU" sz="2400" dirty="0" smtClean="0">
+                <a:latin typeface="DejaVu Sans" panose="020B0603030804020204" pitchFamily="34" charset="0"/>
+                <a:ea typeface="DejaVu Sans" panose="020B0603030804020204" pitchFamily="34" charset="0"/>
+                <a:cs typeface="DejaVu Sans" panose="020B0603030804020204" pitchFamily="34" charset="0"/>
+              </a:rPr>
+              <a:t> </a:t>
+            </a:r>
+            <a:r>
+              <a:rPr lang="en-US" sz="2400" dirty="0" smtClean="0">
+                <a:latin typeface="DejaVu Sans" panose="020B0603030804020204" pitchFamily="34" charset="0"/>
+                <a:ea typeface="DejaVu Sans" panose="020B0603030804020204" pitchFamily="34" charset="0"/>
+                <a:cs typeface="DejaVu Sans" panose="020B0603030804020204" pitchFamily="34" charset="0"/>
+              </a:rPr>
+              <a:t>&amp;</a:t>
+            </a:r>
+            <a:r>
+              <a:rPr lang="ru-RU" sz="2400" dirty="0" smtClean="0">
+                <a:latin typeface="DejaVu Sans" panose="020B0603030804020204" pitchFamily="34" charset="0"/>
+                <a:ea typeface="DejaVu Sans" panose="020B0603030804020204" pitchFamily="34" charset="0"/>
+                <a:cs typeface="DejaVu Sans" panose="020B0603030804020204" pitchFamily="34" charset="0"/>
+              </a:rPr>
+              <a:t> </a:t>
+            </a:r>
+            <a:r>
+              <a:rPr lang="en-US" sz="2400" dirty="0" err="1">
+                <a:latin typeface="DejaVu Sans" panose="020B0603030804020204" pitchFamily="34" charset="0"/>
+                <a:ea typeface="DejaVu Sans" panose="020B0603030804020204" pitchFamily="34" charset="0"/>
+                <a:cs typeface="DejaVu Sans" panose="020B0603030804020204" pitchFamily="34" charset="0"/>
+              </a:rPr>
+              <a:t>Prabhu</a:t>
+            </a:r>
+            <a:r>
+              <a:rPr lang="en-US" sz="2400" dirty="0">
+                <a:latin typeface="DejaVu Sans" panose="020B0603030804020204" pitchFamily="34" charset="0"/>
+                <a:ea typeface="DejaVu Sans" panose="020B0603030804020204" pitchFamily="34" charset="0"/>
+                <a:cs typeface="DejaVu Sans" panose="020B0603030804020204" pitchFamily="34" charset="0"/>
+              </a:rPr>
+              <a:t> </a:t>
+            </a:r>
+            <a:r>
+              <a:rPr lang="en-US" sz="2400" dirty="0" err="1" smtClean="0">
+                <a:latin typeface="DejaVu Sans" panose="020B0603030804020204" pitchFamily="34" charset="0"/>
+                <a:ea typeface="DejaVu Sans" panose="020B0603030804020204" pitchFamily="34" charset="0"/>
+                <a:cs typeface="DejaVu Sans" panose="020B0603030804020204" pitchFamily="34" charset="0"/>
+              </a:rPr>
+              <a:t>Goel</a:t>
+            </a:r>
+            <a:endParaRPr lang="ru-RU" sz="2400" dirty="0" smtClean="0">
+              <a:latin typeface="DejaVu Sans" panose="020B0603030804020204" pitchFamily="34" charset="0"/>
+              <a:ea typeface="DejaVu Sans" panose="020B0603030804020204" pitchFamily="34" charset="0"/>
+              <a:cs typeface="DejaVu Sans" panose="020B0603030804020204" pitchFamily="34" charset="0"/>
+            </a:endParaRPr>
+          </a:p>
+          <a:p>
+            <a:r>
+              <a:rPr lang="ru-RU" sz="2400" dirty="0" smtClean="0">
+                <a:latin typeface="DejaVu Sans" panose="020B0603030804020204" pitchFamily="34" charset="0"/>
+                <a:ea typeface="DejaVu Sans" panose="020B0603030804020204" pitchFamily="34" charset="0"/>
+                <a:cs typeface="DejaVu Sans" panose="020B0603030804020204" pitchFamily="34" charset="0"/>
+              </a:rPr>
+              <a:t>«</a:t>
+            </a:r>
+            <a:r>
+              <a:rPr lang="en-US" sz="2400" dirty="0" smtClean="0">
+                <a:latin typeface="DejaVu Sans" panose="020B0603030804020204" pitchFamily="34" charset="0"/>
+                <a:ea typeface="DejaVu Sans" panose="020B0603030804020204" pitchFamily="34" charset="0"/>
+                <a:cs typeface="DejaVu Sans" panose="020B0603030804020204" pitchFamily="34" charset="0"/>
+              </a:rPr>
+              <a:t>Automated </a:t>
+            </a:r>
+            <a:r>
+              <a:rPr lang="en-US" sz="2400" dirty="0">
+                <a:latin typeface="DejaVu Sans" panose="020B0603030804020204" pitchFamily="34" charset="0"/>
+                <a:ea typeface="DejaVu Sans" panose="020B0603030804020204" pitchFamily="34" charset="0"/>
+                <a:cs typeface="DejaVu Sans" panose="020B0603030804020204" pitchFamily="34" charset="0"/>
+              </a:rPr>
+              <a:t>Integrated Design </a:t>
+            </a:r>
+            <a:r>
+              <a:rPr lang="en-US" sz="2400" dirty="0" smtClean="0">
+                <a:latin typeface="DejaVu Sans" panose="020B0603030804020204" pitchFamily="34" charset="0"/>
+                <a:ea typeface="DejaVu Sans" panose="020B0603030804020204" pitchFamily="34" charset="0"/>
+                <a:cs typeface="DejaVu Sans" panose="020B0603030804020204" pitchFamily="34" charset="0"/>
+              </a:rPr>
+              <a:t>Systems</a:t>
+            </a:r>
+            <a:r>
+              <a:rPr lang="ru-RU" sz="2400" dirty="0" smtClean="0">
+                <a:latin typeface="DejaVu Sans" panose="020B0603030804020204" pitchFamily="34" charset="0"/>
+                <a:ea typeface="DejaVu Sans" panose="020B0603030804020204" pitchFamily="34" charset="0"/>
+                <a:cs typeface="DejaVu Sans" panose="020B0603030804020204" pitchFamily="34" charset="0"/>
+              </a:rPr>
+              <a:t>», 1984 г.</a:t>
+            </a:r>
+          </a:p>
+          <a:p>
+            <a:endParaRPr lang="ru-RU" sz="2400" dirty="0" smtClean="0">
+              <a:latin typeface="DejaVu Sans" panose="020B0603030804020204" pitchFamily="34" charset="0"/>
+              <a:ea typeface="DejaVu Sans" panose="020B0603030804020204" pitchFamily="34" charset="0"/>
+              <a:cs typeface="DejaVu Sans" panose="020B0603030804020204" pitchFamily="34" charset="0"/>
+            </a:endParaRPr>
+          </a:p>
+          <a:p>
+            <a:r>
+              <a:rPr lang="en-US" sz="2400" dirty="0" err="1" smtClean="0">
+                <a:latin typeface="DejaVu Sans" panose="020B0603030804020204" pitchFamily="34" charset="0"/>
+                <a:ea typeface="DejaVu Sans" panose="020B0603030804020204" pitchFamily="34" charset="0"/>
+                <a:cs typeface="DejaVu Sans" panose="020B0603030804020204" pitchFamily="34" charset="0"/>
+              </a:rPr>
+              <a:t>Netlist</a:t>
+            </a:r>
+            <a:r>
+              <a:rPr lang="en-US" sz="2400" dirty="0" smtClean="0">
+                <a:latin typeface="DejaVu Sans" panose="020B0603030804020204" pitchFamily="34" charset="0"/>
+                <a:ea typeface="DejaVu Sans" panose="020B0603030804020204" pitchFamily="34" charset="0"/>
+                <a:cs typeface="DejaVu Sans" panose="020B0603030804020204" pitchFamily="34" charset="0"/>
+              </a:rPr>
+              <a:t> — </a:t>
+            </a:r>
+            <a:r>
+              <a:rPr lang="ru-RU" sz="2400" dirty="0">
+                <a:latin typeface="DejaVu Sans" panose="020B0603030804020204" pitchFamily="34" charset="0"/>
+                <a:ea typeface="DejaVu Sans" panose="020B0603030804020204" pitchFamily="34" charset="0"/>
+                <a:cs typeface="DejaVu Sans" panose="020B0603030804020204" pitchFamily="34" charset="0"/>
+              </a:rPr>
+              <a:t>логически </a:t>
+            </a:r>
+            <a:r>
+              <a:rPr lang="ru-RU" sz="2400" dirty="0" smtClean="0">
+                <a:latin typeface="DejaVu Sans" panose="020B0603030804020204" pitchFamily="34" charset="0"/>
+                <a:ea typeface="DejaVu Sans" panose="020B0603030804020204" pitchFamily="34" charset="0"/>
+                <a:cs typeface="DejaVu Sans" panose="020B0603030804020204" pitchFamily="34" charset="0"/>
+              </a:rPr>
+              <a:t>эквивалентное</a:t>
+            </a:r>
+            <a:r>
+              <a:rPr lang="en-US" sz="2400" dirty="0" smtClean="0">
+                <a:latin typeface="DejaVu Sans" panose="020B0603030804020204" pitchFamily="34" charset="0"/>
+                <a:ea typeface="DejaVu Sans" panose="020B0603030804020204" pitchFamily="34" charset="0"/>
+                <a:cs typeface="DejaVu Sans" panose="020B0603030804020204" pitchFamily="34" charset="0"/>
+              </a:rPr>
+              <a:t> </a:t>
+            </a:r>
+            <a:r>
+              <a:rPr lang="ru-RU" sz="2400" dirty="0" smtClean="0">
+                <a:latin typeface="DejaVu Sans" panose="020B0603030804020204" pitchFamily="34" charset="0"/>
+                <a:ea typeface="DejaVu Sans" panose="020B0603030804020204" pitchFamily="34" charset="0"/>
+                <a:cs typeface="DejaVu Sans" panose="020B0603030804020204" pitchFamily="34" charset="0"/>
+              </a:rPr>
+              <a:t>описание</a:t>
+            </a:r>
+            <a:r>
+              <a:rPr lang="ru-RU" sz="2400" dirty="0">
+                <a:latin typeface="DejaVu Sans" panose="020B0603030804020204" pitchFamily="34" charset="0"/>
+                <a:ea typeface="DejaVu Sans" panose="020B0603030804020204" pitchFamily="34" charset="0"/>
+                <a:cs typeface="DejaVu Sans" panose="020B0603030804020204" pitchFamily="34" charset="0"/>
+              </a:rPr>
+              <a:t>, состоящее из элементарных логических примитивов</a:t>
+            </a:r>
+          </a:p>
+          <a:p>
+            <a:endParaRPr lang="ru-RU" sz="2400" dirty="0" smtClean="0">
+              <a:latin typeface="DejaVu Sans" panose="020B0603030804020204" pitchFamily="34" charset="0"/>
+              <a:ea typeface="DejaVu Sans" panose="020B0603030804020204" pitchFamily="34" charset="0"/>
+              <a:cs typeface="DejaVu Sans" panose="020B0603030804020204" pitchFamily="34" charset="0"/>
+            </a:endParaRPr>
+          </a:p>
+          <a:p>
+            <a:r>
+              <a:rPr lang="ru-RU" sz="2400" dirty="0" smtClean="0">
+                <a:latin typeface="DejaVu Sans" panose="020B0603030804020204" pitchFamily="34" charset="0"/>
+                <a:ea typeface="DejaVu Sans" panose="020B0603030804020204" pitchFamily="34" charset="0"/>
+                <a:cs typeface="DejaVu Sans" panose="020B0603030804020204" pitchFamily="34" charset="0"/>
+              </a:rPr>
+              <a:t>Команды:</a:t>
+            </a:r>
+          </a:p>
+          <a:p>
+            <a:pPr marL="285750" indent="-285750">
+              <a:buFont typeface="Arial" pitchFamily="34" charset="0"/>
+              <a:buChar char="•"/>
+            </a:pPr>
+            <a:r>
+              <a:rPr lang="ru-RU" sz="2400" dirty="0" smtClean="0">
+                <a:latin typeface="DejaVu Sans" panose="020B0603030804020204" pitchFamily="34" charset="0"/>
+                <a:ea typeface="DejaVu Sans" panose="020B0603030804020204" pitchFamily="34" charset="0"/>
+                <a:cs typeface="DejaVu Sans" panose="020B0603030804020204" pitchFamily="34" charset="0"/>
+              </a:rPr>
+              <a:t>Синтезируемые </a:t>
+            </a:r>
+            <a:r>
+              <a:rPr lang="en-US" sz="2400" dirty="0">
+                <a:latin typeface="DejaVu Sans" panose="020B0603030804020204" pitchFamily="34" charset="0"/>
+                <a:ea typeface="DejaVu Sans" panose="020B0603030804020204" pitchFamily="34" charset="0"/>
+                <a:cs typeface="DejaVu Sans" panose="020B0603030804020204" pitchFamily="34" charset="0"/>
+              </a:rPr>
+              <a:t>—</a:t>
+            </a:r>
+            <a:r>
+              <a:rPr lang="ru-RU" sz="2400" dirty="0" smtClean="0">
+                <a:latin typeface="DejaVu Sans" panose="020B0603030804020204" pitchFamily="34" charset="0"/>
+                <a:ea typeface="DejaVu Sans" panose="020B0603030804020204" pitchFamily="34" charset="0"/>
+                <a:cs typeface="DejaVu Sans" panose="020B0603030804020204" pitchFamily="34" charset="0"/>
+              </a:rPr>
+              <a:t> </a:t>
+            </a:r>
+            <a:r>
+              <a:rPr lang="ru-RU" sz="2400" dirty="0" smtClean="0">
+                <a:latin typeface="DejaVu Sans" panose="020B0603030804020204" pitchFamily="34" charset="0"/>
+                <a:ea typeface="DejaVu Sans" panose="020B0603030804020204" pitchFamily="34" charset="0"/>
+                <a:cs typeface="DejaVu Sans" panose="020B0603030804020204" pitchFamily="34" charset="0"/>
+              </a:rPr>
+              <a:t>представленные в аппаратуре</a:t>
+            </a:r>
+            <a:endParaRPr lang="ru-RU" sz="2400" dirty="0">
+              <a:latin typeface="DejaVu Sans" panose="020B0603030804020204" pitchFamily="34" charset="0"/>
+              <a:ea typeface="DejaVu Sans" panose="020B0603030804020204" pitchFamily="34" charset="0"/>
+              <a:cs typeface="DejaVu Sans" panose="020B0603030804020204" pitchFamily="34" charset="0"/>
+            </a:endParaRPr>
+          </a:p>
+          <a:p>
+            <a:pPr marL="285750" indent="-285750">
+              <a:buFont typeface="Arial" pitchFamily="34" charset="0"/>
+              <a:buChar char="•"/>
+            </a:pPr>
+            <a:r>
+              <a:rPr lang="ru-RU" sz="2400" dirty="0" err="1" smtClean="0">
+                <a:latin typeface="DejaVu Sans" panose="020B0603030804020204" pitchFamily="34" charset="0"/>
+                <a:ea typeface="DejaVu Sans" panose="020B0603030804020204" pitchFamily="34" charset="0"/>
+                <a:cs typeface="DejaVu Sans" panose="020B0603030804020204" pitchFamily="34" charset="0"/>
+              </a:rPr>
+              <a:t>Несинтезируемые</a:t>
+            </a:r>
+            <a:r>
+              <a:rPr lang="ru-RU" sz="2400" dirty="0" smtClean="0">
+                <a:latin typeface="DejaVu Sans" panose="020B0603030804020204" pitchFamily="34" charset="0"/>
+                <a:ea typeface="DejaVu Sans" panose="020B0603030804020204" pitchFamily="34" charset="0"/>
+                <a:cs typeface="DejaVu Sans" panose="020B0603030804020204" pitchFamily="34" charset="0"/>
+              </a:rPr>
+              <a:t> </a:t>
+            </a:r>
+            <a:r>
+              <a:rPr lang="en-US" sz="2400" dirty="0">
+                <a:latin typeface="DejaVu Sans" panose="020B0603030804020204" pitchFamily="34" charset="0"/>
+                <a:ea typeface="DejaVu Sans" panose="020B0603030804020204" pitchFamily="34" charset="0"/>
+                <a:cs typeface="DejaVu Sans" panose="020B0603030804020204" pitchFamily="34" charset="0"/>
+              </a:rPr>
+              <a:t>—</a:t>
+            </a:r>
+            <a:r>
+              <a:rPr lang="ru-RU" sz="2400" dirty="0" smtClean="0">
+                <a:latin typeface="DejaVu Sans" panose="020B0603030804020204" pitchFamily="34" charset="0"/>
+                <a:ea typeface="DejaVu Sans" panose="020B0603030804020204" pitchFamily="34" charset="0"/>
+                <a:cs typeface="DejaVu Sans" panose="020B0603030804020204" pitchFamily="34" charset="0"/>
+              </a:rPr>
+              <a:t> </a:t>
+            </a:r>
+            <a:r>
+              <a:rPr lang="ru-RU" sz="2400" dirty="0" smtClean="0">
+                <a:latin typeface="DejaVu Sans" panose="020B0603030804020204" pitchFamily="34" charset="0"/>
+                <a:ea typeface="DejaVu Sans" panose="020B0603030804020204" pitchFamily="34" charset="0"/>
+                <a:cs typeface="DejaVu Sans" panose="020B0603030804020204" pitchFamily="34" charset="0"/>
+              </a:rPr>
+              <a:t>для отладки и симуляции</a:t>
+            </a:r>
+            <a:endParaRPr lang="ru-RU" sz="2400" dirty="0">
+              <a:latin typeface="DejaVu Sans" panose="020B0603030804020204" pitchFamily="34" charset="0"/>
+              <a:ea typeface="DejaVu Sans" panose="020B0603030804020204" pitchFamily="34" charset="0"/>
+              <a:cs typeface="DejaVu Sans" panose="020B0603030804020204" pitchFamily="34" charset="0"/>
+            </a:endParaRPr>
+          </a:p>
+        </p:txBody>
+      </p:sp>
     </p:spTree>
     <p:extLst>
       <p:ext uri="{BB962C8B-B14F-4D97-AF65-F5344CB8AC3E}">
-        <p14:creationId xmlns:p14="http://schemas.microsoft.com/office/powerpoint/2010/main" val="2726653295"/>
+        <p14:creationId xmlns:p14="http://schemas.microsoft.com/office/powerpoint/2010/main" val="1421788083"/>
       </p:ext>
     </p:extLst>
   </p:cSld>
@@ -5793,8 +6015,8 @@
       </p:grpSpPr>
       <p:sp>
         <p:nvSpPr>
-          <p:cNvPr id="6" name="Title 5"/>
-          <p:cNvSpPr>
+          <p:cNvPr id="2" name="Title 1"/>
+          <p:cNvSpPr txBox="1">
             <a:spLocks noGrp="1"/>
           </p:cNvSpPr>
           <p:nvPr>
@@ -5806,12 +6028,12 @@
           <a:bodyPr/>
           <a:lstStyle/>
           <a:p>
-            <a:pPr>
+            <a:pPr lvl="0">
               <a:buNone/>
             </a:pPr>
             <a:r>
               <a:rPr lang="en-US" dirty="0" smtClean="0"/>
-              <a:t>Verilog</a:t>
+              <a:t>VHDL</a:t>
             </a:r>
             <a:endParaRPr lang="ru-RU" dirty="0"/>
           </a:p>
@@ -5819,7 +6041,7 @@
       </p:sp>
       <p:sp>
         <p:nvSpPr>
-          <p:cNvPr id="11" name="Date Placeholder 2"/>
+          <p:cNvPr id="3" name="Date Placeholder 2"/>
           <p:cNvSpPr txBox="1"/>
           <p:nvPr/>
         </p:nvSpPr>
@@ -5904,7 +6126,7 @@
       </p:sp>
       <p:sp>
         <p:nvSpPr>
-          <p:cNvPr id="12" name="Footer Placeholder 3"/>
+          <p:cNvPr id="4" name="Footer Placeholder 3"/>
           <p:cNvSpPr txBox="1"/>
           <p:nvPr/>
         </p:nvSpPr>
@@ -5961,7 +6183,7 @@
       </p:sp>
       <p:sp>
         <p:nvSpPr>
-          <p:cNvPr id="13" name="Slide Number Placeholder 4"/>
+          <p:cNvPr id="5" name="Slide Number Placeholder 4"/>
           <p:cNvSpPr txBox="1"/>
           <p:nvPr/>
         </p:nvSpPr>
@@ -6018,14 +6240,14 @@
       </p:sp>
       <p:sp>
         <p:nvSpPr>
-          <p:cNvPr id="2" name="TextBox 1"/>
+          <p:cNvPr id="11" name="TextBox 10"/>
           <p:cNvSpPr txBox="1"/>
           <p:nvPr/>
         </p:nvSpPr>
         <p:spPr>
           <a:xfrm>
-            <a:off x="179512" y="1116138"/>
-            <a:ext cx="8640960" cy="3785652"/>
+            <a:off x="395536" y="1547862"/>
+            <a:ext cx="8352928" cy="3539430"/>
           </a:xfrm>
           <a:prstGeom prst="rect">
             <a:avLst/>
@@ -6056,300 +6278,76 @@
           </a:bodyPr>
           <a:lstStyle/>
           <a:p>
-            <a:r>
-              <a:rPr lang="en-US" sz="2400" dirty="0" smtClean="0">
-                <a:latin typeface="DejaVu Sans" panose="020B0603030804020204" pitchFamily="34" charset="0"/>
-                <a:ea typeface="DejaVu Sans" panose="020B0603030804020204" pitchFamily="34" charset="0"/>
-                <a:cs typeface="DejaVu Sans" panose="020B0603030804020204" pitchFamily="34" charset="0"/>
-              </a:rPr>
-              <a:t>Phil </a:t>
-            </a:r>
-            <a:r>
-              <a:rPr lang="en-US" sz="2400" dirty="0" err="1" smtClean="0">
-                <a:latin typeface="DejaVu Sans" panose="020B0603030804020204" pitchFamily="34" charset="0"/>
-                <a:ea typeface="DejaVu Sans" panose="020B0603030804020204" pitchFamily="34" charset="0"/>
-                <a:cs typeface="DejaVu Sans" panose="020B0603030804020204" pitchFamily="34" charset="0"/>
-              </a:rPr>
-              <a:t>Moorby</a:t>
-            </a:r>
-            <a:r>
-              <a:rPr lang="ru-RU" sz="2400" dirty="0" smtClean="0">
-                <a:latin typeface="DejaVu Sans" panose="020B0603030804020204" pitchFamily="34" charset="0"/>
-                <a:ea typeface="DejaVu Sans" panose="020B0603030804020204" pitchFamily="34" charset="0"/>
-                <a:cs typeface="DejaVu Sans" panose="020B0603030804020204" pitchFamily="34" charset="0"/>
-              </a:rPr>
-              <a:t> </a:t>
-            </a:r>
-            <a:r>
-              <a:rPr lang="en-US" sz="2400" dirty="0" smtClean="0">
-                <a:latin typeface="DejaVu Sans" panose="020B0603030804020204" pitchFamily="34" charset="0"/>
-                <a:ea typeface="DejaVu Sans" panose="020B0603030804020204" pitchFamily="34" charset="0"/>
-                <a:cs typeface="DejaVu Sans" panose="020B0603030804020204" pitchFamily="34" charset="0"/>
-              </a:rPr>
-              <a:t>&amp;</a:t>
-            </a:r>
-            <a:r>
-              <a:rPr lang="ru-RU" sz="2400" dirty="0" smtClean="0">
-                <a:latin typeface="DejaVu Sans" panose="020B0603030804020204" pitchFamily="34" charset="0"/>
-                <a:ea typeface="DejaVu Sans" panose="020B0603030804020204" pitchFamily="34" charset="0"/>
-                <a:cs typeface="DejaVu Sans" panose="020B0603030804020204" pitchFamily="34" charset="0"/>
-              </a:rPr>
-              <a:t> </a:t>
-            </a:r>
-            <a:r>
-              <a:rPr lang="en-US" sz="2400" dirty="0" err="1">
-                <a:latin typeface="DejaVu Sans" panose="020B0603030804020204" pitchFamily="34" charset="0"/>
-                <a:ea typeface="DejaVu Sans" panose="020B0603030804020204" pitchFamily="34" charset="0"/>
-                <a:cs typeface="DejaVu Sans" panose="020B0603030804020204" pitchFamily="34" charset="0"/>
-              </a:rPr>
-              <a:t>Prabhu</a:t>
-            </a:r>
-            <a:r>
-              <a:rPr lang="en-US" sz="2400" dirty="0">
-                <a:latin typeface="DejaVu Sans" panose="020B0603030804020204" pitchFamily="34" charset="0"/>
-                <a:ea typeface="DejaVu Sans" panose="020B0603030804020204" pitchFamily="34" charset="0"/>
-                <a:cs typeface="DejaVu Sans" panose="020B0603030804020204" pitchFamily="34" charset="0"/>
-              </a:rPr>
-              <a:t> </a:t>
-            </a:r>
-            <a:r>
-              <a:rPr lang="en-US" sz="2400" dirty="0" err="1" smtClean="0">
-                <a:latin typeface="DejaVu Sans" panose="020B0603030804020204" pitchFamily="34" charset="0"/>
-                <a:ea typeface="DejaVu Sans" panose="020B0603030804020204" pitchFamily="34" charset="0"/>
-                <a:cs typeface="DejaVu Sans" panose="020B0603030804020204" pitchFamily="34" charset="0"/>
-              </a:rPr>
-              <a:t>Goel</a:t>
-            </a:r>
-            <a:endParaRPr lang="ru-RU" sz="2400" dirty="0" smtClean="0">
+            <a:pPr marL="342900" indent="-342900">
+              <a:buFont typeface="Arial" pitchFamily="34" charset="0"/>
+              <a:buChar char="•"/>
+            </a:pPr>
+            <a:r>
+              <a:rPr lang="ru-RU" sz="3200" dirty="0" smtClean="0">
+                <a:latin typeface="DejaVu Sans" panose="020B0603030804020204" pitchFamily="34" charset="0"/>
+                <a:ea typeface="DejaVu Sans" panose="020B0603030804020204" pitchFamily="34" charset="0"/>
+                <a:cs typeface="DejaVu Sans" panose="020B0603030804020204" pitchFamily="34" charset="0"/>
+              </a:rPr>
+              <a:t>Был разработан в 1983 г. по заказу Министерства обороны </a:t>
+            </a:r>
+            <a:r>
+              <a:rPr lang="ru-RU" sz="3200" dirty="0" smtClean="0">
+                <a:latin typeface="DejaVu Sans" panose="020B0603030804020204" pitchFamily="34" charset="0"/>
+                <a:ea typeface="DejaVu Sans" panose="020B0603030804020204" pitchFamily="34" charset="0"/>
+                <a:cs typeface="DejaVu Sans" panose="020B0603030804020204" pitchFamily="34" charset="0"/>
+              </a:rPr>
+              <a:t>США</a:t>
+            </a:r>
+            <a:endParaRPr lang="ru-RU" sz="3200" dirty="0" smtClean="0">
               <a:latin typeface="DejaVu Sans" panose="020B0603030804020204" pitchFamily="34" charset="0"/>
               <a:ea typeface="DejaVu Sans" panose="020B0603030804020204" pitchFamily="34" charset="0"/>
               <a:cs typeface="DejaVu Sans" panose="020B0603030804020204" pitchFamily="34" charset="0"/>
             </a:endParaRPr>
           </a:p>
           <a:p>
-            <a:r>
-              <a:rPr lang="ru-RU" sz="2400" dirty="0" smtClean="0">
-                <a:latin typeface="DejaVu Sans" panose="020B0603030804020204" pitchFamily="34" charset="0"/>
-                <a:ea typeface="DejaVu Sans" panose="020B0603030804020204" pitchFamily="34" charset="0"/>
-                <a:cs typeface="DejaVu Sans" panose="020B0603030804020204" pitchFamily="34" charset="0"/>
-              </a:rPr>
-              <a:t>«</a:t>
-            </a:r>
-            <a:r>
-              <a:rPr lang="en-US" sz="2400" dirty="0" smtClean="0">
-                <a:latin typeface="DejaVu Sans" panose="020B0603030804020204" pitchFamily="34" charset="0"/>
-                <a:ea typeface="DejaVu Sans" panose="020B0603030804020204" pitchFamily="34" charset="0"/>
-                <a:cs typeface="DejaVu Sans" panose="020B0603030804020204" pitchFamily="34" charset="0"/>
-              </a:rPr>
-              <a:t>Automated </a:t>
-            </a:r>
-            <a:r>
-              <a:rPr lang="en-US" sz="2400" dirty="0">
-                <a:latin typeface="DejaVu Sans" panose="020B0603030804020204" pitchFamily="34" charset="0"/>
-                <a:ea typeface="DejaVu Sans" panose="020B0603030804020204" pitchFamily="34" charset="0"/>
-                <a:cs typeface="DejaVu Sans" panose="020B0603030804020204" pitchFamily="34" charset="0"/>
-              </a:rPr>
-              <a:t>Integrated Design </a:t>
-            </a:r>
-            <a:r>
-              <a:rPr lang="en-US" sz="2400" dirty="0" smtClean="0">
-                <a:latin typeface="DejaVu Sans" panose="020B0603030804020204" pitchFamily="34" charset="0"/>
-                <a:ea typeface="DejaVu Sans" panose="020B0603030804020204" pitchFamily="34" charset="0"/>
-                <a:cs typeface="DejaVu Sans" panose="020B0603030804020204" pitchFamily="34" charset="0"/>
-              </a:rPr>
-              <a:t>Systems</a:t>
-            </a:r>
-            <a:r>
-              <a:rPr lang="ru-RU" sz="2400" dirty="0" smtClean="0">
-                <a:latin typeface="DejaVu Sans" panose="020B0603030804020204" pitchFamily="34" charset="0"/>
-                <a:ea typeface="DejaVu Sans" panose="020B0603030804020204" pitchFamily="34" charset="0"/>
-                <a:cs typeface="DejaVu Sans" panose="020B0603030804020204" pitchFamily="34" charset="0"/>
-              </a:rPr>
-              <a:t>», 1984 г.</a:t>
-            </a:r>
-          </a:p>
-          <a:p>
-            <a:endParaRPr lang="ru-RU" sz="2400" dirty="0" smtClean="0">
+            <a:pPr marL="342900" indent="-342900">
+              <a:buFont typeface="Arial" pitchFamily="34" charset="0"/>
+              <a:buChar char="•"/>
+            </a:pPr>
+            <a:endParaRPr lang="ru-RU" sz="3200" dirty="0" smtClean="0">
               <a:latin typeface="DejaVu Sans" panose="020B0603030804020204" pitchFamily="34" charset="0"/>
               <a:ea typeface="DejaVu Sans" panose="020B0603030804020204" pitchFamily="34" charset="0"/>
               <a:cs typeface="DejaVu Sans" panose="020B0603030804020204" pitchFamily="34" charset="0"/>
             </a:endParaRPr>
           </a:p>
           <a:p>
-            <a:r>
-              <a:rPr lang="en-US" sz="2400" dirty="0" err="1" smtClean="0">
-                <a:latin typeface="DejaVu Sans" panose="020B0603030804020204" pitchFamily="34" charset="0"/>
-                <a:ea typeface="DejaVu Sans" panose="020B0603030804020204" pitchFamily="34" charset="0"/>
-                <a:cs typeface="DejaVu Sans" panose="020B0603030804020204" pitchFamily="34" charset="0"/>
-              </a:rPr>
-              <a:t>Netlist</a:t>
-            </a:r>
-            <a:r>
-              <a:rPr lang="en-US" sz="2400" dirty="0" smtClean="0">
-                <a:latin typeface="DejaVu Sans" panose="020B0603030804020204" pitchFamily="34" charset="0"/>
-                <a:ea typeface="DejaVu Sans" panose="020B0603030804020204" pitchFamily="34" charset="0"/>
-                <a:cs typeface="DejaVu Sans" panose="020B0603030804020204" pitchFamily="34" charset="0"/>
-              </a:rPr>
-              <a:t> — </a:t>
-            </a:r>
-            <a:r>
-              <a:rPr lang="ru-RU" sz="2400" dirty="0">
-                <a:latin typeface="DejaVu Sans" panose="020B0603030804020204" pitchFamily="34" charset="0"/>
-                <a:ea typeface="DejaVu Sans" panose="020B0603030804020204" pitchFamily="34" charset="0"/>
-                <a:cs typeface="DejaVu Sans" panose="020B0603030804020204" pitchFamily="34" charset="0"/>
-              </a:rPr>
-              <a:t>логически </a:t>
-            </a:r>
-            <a:r>
-              <a:rPr lang="ru-RU" sz="2400" dirty="0" smtClean="0">
-                <a:latin typeface="DejaVu Sans" panose="020B0603030804020204" pitchFamily="34" charset="0"/>
-                <a:ea typeface="DejaVu Sans" panose="020B0603030804020204" pitchFamily="34" charset="0"/>
-                <a:cs typeface="DejaVu Sans" panose="020B0603030804020204" pitchFamily="34" charset="0"/>
-              </a:rPr>
-              <a:t>эквивалентное</a:t>
-            </a:r>
-            <a:r>
-              <a:rPr lang="en-US" sz="2400" dirty="0" smtClean="0">
-                <a:latin typeface="DejaVu Sans" panose="020B0603030804020204" pitchFamily="34" charset="0"/>
-                <a:ea typeface="DejaVu Sans" panose="020B0603030804020204" pitchFamily="34" charset="0"/>
-                <a:cs typeface="DejaVu Sans" panose="020B0603030804020204" pitchFamily="34" charset="0"/>
-              </a:rPr>
-              <a:t> </a:t>
-            </a:r>
-            <a:r>
-              <a:rPr lang="ru-RU" sz="2400" dirty="0" smtClean="0">
-                <a:latin typeface="DejaVu Sans" panose="020B0603030804020204" pitchFamily="34" charset="0"/>
-                <a:ea typeface="DejaVu Sans" panose="020B0603030804020204" pitchFamily="34" charset="0"/>
-                <a:cs typeface="DejaVu Sans" panose="020B0603030804020204" pitchFamily="34" charset="0"/>
-              </a:rPr>
-              <a:t>описание</a:t>
-            </a:r>
-            <a:r>
-              <a:rPr lang="ru-RU" sz="2400" dirty="0">
-                <a:latin typeface="DejaVu Sans" panose="020B0603030804020204" pitchFamily="34" charset="0"/>
-                <a:ea typeface="DejaVu Sans" panose="020B0603030804020204" pitchFamily="34" charset="0"/>
-                <a:cs typeface="DejaVu Sans" panose="020B0603030804020204" pitchFamily="34" charset="0"/>
-              </a:rPr>
-              <a:t>, состоящее из элементарных логических примитивов</a:t>
-            </a:r>
-          </a:p>
-          <a:p>
-            <a:endParaRPr lang="ru-RU" sz="2400" dirty="0" smtClean="0">
+            <a:pPr marL="342900" indent="-342900">
+              <a:buFont typeface="Arial" pitchFamily="34" charset="0"/>
+              <a:buChar char="•"/>
+            </a:pPr>
+            <a:r>
+              <a:rPr lang="ru-RU" sz="3200" dirty="0" smtClean="0">
+                <a:latin typeface="DejaVu Sans" panose="020B0603030804020204" pitchFamily="34" charset="0"/>
+                <a:ea typeface="DejaVu Sans" panose="020B0603030804020204" pitchFamily="34" charset="0"/>
+                <a:cs typeface="DejaVu Sans" panose="020B0603030804020204" pitchFamily="34" charset="0"/>
+              </a:rPr>
+              <a:t>Первоначально предназначался для моделирования, но позже появилась и синтезируемое </a:t>
+            </a:r>
+            <a:r>
+              <a:rPr lang="ru-RU" sz="3200" dirty="0" smtClean="0">
+                <a:latin typeface="DejaVu Sans" panose="020B0603030804020204" pitchFamily="34" charset="0"/>
+                <a:ea typeface="DejaVu Sans" panose="020B0603030804020204" pitchFamily="34" charset="0"/>
+                <a:cs typeface="DejaVu Sans" panose="020B0603030804020204" pitchFamily="34" charset="0"/>
+              </a:rPr>
+              <a:t>подмножество</a:t>
+            </a:r>
+            <a:endParaRPr lang="ru-RU" sz="3200" dirty="0">
               <a:latin typeface="DejaVu Sans" panose="020B0603030804020204" pitchFamily="34" charset="0"/>
               <a:ea typeface="DejaVu Sans" panose="020B0603030804020204" pitchFamily="34" charset="0"/>
               <a:cs typeface="DejaVu Sans" panose="020B0603030804020204" pitchFamily="34" charset="0"/>
             </a:endParaRPr>
           </a:p>
-          <a:p>
-            <a:r>
-              <a:rPr lang="ru-RU" sz="2400" dirty="0" smtClean="0">
-                <a:latin typeface="DejaVu Sans" panose="020B0603030804020204" pitchFamily="34" charset="0"/>
-                <a:ea typeface="DejaVu Sans" panose="020B0603030804020204" pitchFamily="34" charset="0"/>
-                <a:cs typeface="DejaVu Sans" panose="020B0603030804020204" pitchFamily="34" charset="0"/>
-              </a:rPr>
-              <a:t>Команды:</a:t>
-            </a:r>
-          </a:p>
-          <a:p>
-            <a:pPr marL="285750" indent="-285750">
-              <a:buFont typeface="Arial" pitchFamily="34" charset="0"/>
-              <a:buChar char="•"/>
-            </a:pPr>
-            <a:r>
-              <a:rPr lang="ru-RU" sz="2400" dirty="0" smtClean="0">
-                <a:latin typeface="DejaVu Sans" panose="020B0603030804020204" pitchFamily="34" charset="0"/>
-                <a:ea typeface="DejaVu Sans" panose="020B0603030804020204" pitchFamily="34" charset="0"/>
-                <a:cs typeface="DejaVu Sans" panose="020B0603030804020204" pitchFamily="34" charset="0"/>
-              </a:rPr>
-              <a:t>Синтезируемые </a:t>
-            </a:r>
-            <a:r>
-              <a:rPr lang="en-US" sz="2400" dirty="0">
-                <a:latin typeface="DejaVu Sans" panose="020B0603030804020204" pitchFamily="34" charset="0"/>
-                <a:ea typeface="DejaVu Sans" panose="020B0603030804020204" pitchFamily="34" charset="0"/>
-                <a:cs typeface="DejaVu Sans" panose="020B0603030804020204" pitchFamily="34" charset="0"/>
-              </a:rPr>
-              <a:t>—</a:t>
-            </a:r>
-            <a:r>
-              <a:rPr lang="ru-RU" sz="2400" dirty="0" smtClean="0">
-                <a:latin typeface="DejaVu Sans" panose="020B0603030804020204" pitchFamily="34" charset="0"/>
-                <a:ea typeface="DejaVu Sans" panose="020B0603030804020204" pitchFamily="34" charset="0"/>
-                <a:cs typeface="DejaVu Sans" panose="020B0603030804020204" pitchFamily="34" charset="0"/>
-              </a:rPr>
-              <a:t> </a:t>
-            </a:r>
-            <a:r>
-              <a:rPr lang="ru-RU" sz="2400" dirty="0" smtClean="0">
-                <a:latin typeface="DejaVu Sans" panose="020B0603030804020204" pitchFamily="34" charset="0"/>
-                <a:ea typeface="DejaVu Sans" panose="020B0603030804020204" pitchFamily="34" charset="0"/>
-                <a:cs typeface="DejaVu Sans" panose="020B0603030804020204" pitchFamily="34" charset="0"/>
-              </a:rPr>
-              <a:t>представленные в аппаратуре</a:t>
-            </a:r>
-            <a:endParaRPr lang="ru-RU" sz="2400" dirty="0">
-              <a:latin typeface="DejaVu Sans" panose="020B0603030804020204" pitchFamily="34" charset="0"/>
-              <a:ea typeface="DejaVu Sans" panose="020B0603030804020204" pitchFamily="34" charset="0"/>
-              <a:cs typeface="DejaVu Sans" panose="020B0603030804020204" pitchFamily="34" charset="0"/>
-            </a:endParaRPr>
-          </a:p>
-          <a:p>
-            <a:pPr marL="285750" indent="-285750">
-              <a:buFont typeface="Arial" pitchFamily="34" charset="0"/>
-              <a:buChar char="•"/>
-            </a:pPr>
-            <a:r>
-              <a:rPr lang="ru-RU" sz="2400" dirty="0" err="1" smtClean="0">
-                <a:latin typeface="DejaVu Sans" panose="020B0603030804020204" pitchFamily="34" charset="0"/>
-                <a:ea typeface="DejaVu Sans" panose="020B0603030804020204" pitchFamily="34" charset="0"/>
-                <a:cs typeface="DejaVu Sans" panose="020B0603030804020204" pitchFamily="34" charset="0"/>
-              </a:rPr>
-              <a:t>Несинтезируемые</a:t>
-            </a:r>
-            <a:r>
-              <a:rPr lang="ru-RU" sz="2400" dirty="0" smtClean="0">
-                <a:latin typeface="DejaVu Sans" panose="020B0603030804020204" pitchFamily="34" charset="0"/>
-                <a:ea typeface="DejaVu Sans" panose="020B0603030804020204" pitchFamily="34" charset="0"/>
-                <a:cs typeface="DejaVu Sans" panose="020B0603030804020204" pitchFamily="34" charset="0"/>
-              </a:rPr>
-              <a:t> </a:t>
-            </a:r>
-            <a:r>
-              <a:rPr lang="en-US" sz="2400" dirty="0">
-                <a:latin typeface="DejaVu Sans" panose="020B0603030804020204" pitchFamily="34" charset="0"/>
-                <a:ea typeface="DejaVu Sans" panose="020B0603030804020204" pitchFamily="34" charset="0"/>
-                <a:cs typeface="DejaVu Sans" panose="020B0603030804020204" pitchFamily="34" charset="0"/>
-              </a:rPr>
-              <a:t>—</a:t>
-            </a:r>
-            <a:r>
-              <a:rPr lang="ru-RU" sz="2400" dirty="0" smtClean="0">
-                <a:latin typeface="DejaVu Sans" panose="020B0603030804020204" pitchFamily="34" charset="0"/>
-                <a:ea typeface="DejaVu Sans" panose="020B0603030804020204" pitchFamily="34" charset="0"/>
-                <a:cs typeface="DejaVu Sans" panose="020B0603030804020204" pitchFamily="34" charset="0"/>
-              </a:rPr>
-              <a:t> </a:t>
-            </a:r>
-            <a:r>
-              <a:rPr lang="ru-RU" sz="2400" dirty="0" smtClean="0">
-                <a:latin typeface="DejaVu Sans" panose="020B0603030804020204" pitchFamily="34" charset="0"/>
-                <a:ea typeface="DejaVu Sans" panose="020B0603030804020204" pitchFamily="34" charset="0"/>
-                <a:cs typeface="DejaVu Sans" panose="020B0603030804020204" pitchFamily="34" charset="0"/>
-              </a:rPr>
-              <a:t>для отладки и симуляции</a:t>
-            </a:r>
-            <a:endParaRPr lang="ru-RU" sz="2400" dirty="0">
-              <a:latin typeface="DejaVu Sans" panose="020B0603030804020204" pitchFamily="34" charset="0"/>
-              <a:ea typeface="DejaVu Sans" panose="020B0603030804020204" pitchFamily="34" charset="0"/>
-              <a:cs typeface="DejaVu Sans" panose="020B0603030804020204" pitchFamily="34" charset="0"/>
-            </a:endParaRPr>
-          </a:p>
         </p:txBody>
       </p:sp>
     </p:spTree>
     <p:extLst>
       <p:ext uri="{BB962C8B-B14F-4D97-AF65-F5344CB8AC3E}">
-        <p14:creationId xmlns:p14="http://schemas.microsoft.com/office/powerpoint/2010/main" val="1421788083"/>
+        <p14:creationId xmlns:p14="http://schemas.microsoft.com/office/powerpoint/2010/main" val="3776547572"/>
       </p:ext>
     </p:extLst>
   </p:cSld>
@@ -6410,8 +6408,8 @@
               <a:buNone/>
             </a:pPr>
             <a:r>
-              <a:rPr lang="en-US" dirty="0" smtClean="0"/>
-              <a:t>VHDL</a:t>
+              <a:rPr lang="ru-RU" dirty="0" smtClean="0"/>
+              <a:t>Литература</a:t>
             </a:r>
             <a:endParaRPr lang="ru-RU" dirty="0"/>
           </a:p>
@@ -6625,7 +6623,7 @@
         <p:spPr>
           <a:xfrm>
             <a:off x="395536" y="1547862"/>
-            <a:ext cx="8352928" cy="3539430"/>
+            <a:ext cx="8352928" cy="1815882"/>
           </a:xfrm>
           <a:prstGeom prst="rect">
             <a:avLst/>
@@ -6661,71 +6659,227 @@
               <a:buChar char="•"/>
             </a:pPr>
             <a:r>
-              <a:rPr lang="ru-RU" sz="3200" dirty="0" smtClean="0">
-                <a:latin typeface="DejaVu Sans" panose="020B0603030804020204" pitchFamily="34" charset="0"/>
-                <a:ea typeface="DejaVu Sans" panose="020B0603030804020204" pitchFamily="34" charset="0"/>
-                <a:cs typeface="DejaVu Sans" panose="020B0603030804020204" pitchFamily="34" charset="0"/>
-              </a:rPr>
-              <a:t>Был разработан в 1983 г. по заказу Министерства обороны </a:t>
-            </a:r>
-            <a:r>
-              <a:rPr lang="ru-RU" sz="3200" dirty="0" smtClean="0">
-                <a:latin typeface="DejaVu Sans" panose="020B0603030804020204" pitchFamily="34" charset="0"/>
-                <a:ea typeface="DejaVu Sans" panose="020B0603030804020204" pitchFamily="34" charset="0"/>
-                <a:cs typeface="DejaVu Sans" panose="020B0603030804020204" pitchFamily="34" charset="0"/>
-              </a:rPr>
-              <a:t>США</a:t>
-            </a:r>
-            <a:endParaRPr lang="ru-RU" sz="3200" dirty="0" smtClean="0">
+              <a:rPr lang="en-US" sz="1600" dirty="0">
+                <a:latin typeface="DejaVu Sans" panose="020B0603030804020204" pitchFamily="34" charset="0"/>
+                <a:ea typeface="DejaVu Sans" panose="020B0603030804020204" pitchFamily="34" charset="0"/>
+                <a:cs typeface="DejaVu Sans" panose="020B0603030804020204" pitchFamily="34" charset="0"/>
+              </a:rPr>
+              <a:t>Architecture implementation using the machine </a:t>
+            </a:r>
+            <a:r>
+              <a:rPr lang="en-US" sz="1600" dirty="0" smtClean="0">
+                <a:latin typeface="DejaVu Sans" panose="020B0603030804020204" pitchFamily="34" charset="0"/>
+                <a:ea typeface="DejaVu Sans" panose="020B0603030804020204" pitchFamily="34" charset="0"/>
+                <a:cs typeface="DejaVu Sans" panose="020B0603030804020204" pitchFamily="34" charset="0"/>
+              </a:rPr>
+              <a:t>description language </a:t>
+            </a:r>
+            <a:r>
+              <a:rPr lang="en-US" sz="1600" dirty="0">
+                <a:latin typeface="DejaVu Sans" panose="020B0603030804020204" pitchFamily="34" charset="0"/>
+                <a:ea typeface="DejaVu Sans" panose="020B0603030804020204" pitchFamily="34" charset="0"/>
+                <a:cs typeface="DejaVu Sans" panose="020B0603030804020204" pitchFamily="34" charset="0"/>
+              </a:rPr>
+              <a:t>LISA / O. </a:t>
+            </a:r>
+            <a:r>
+              <a:rPr lang="en-US" sz="1600" dirty="0" err="1">
+                <a:latin typeface="DejaVu Sans" panose="020B0603030804020204" pitchFamily="34" charset="0"/>
+                <a:ea typeface="DejaVu Sans" panose="020B0603030804020204" pitchFamily="34" charset="0"/>
+                <a:cs typeface="DejaVu Sans" panose="020B0603030804020204" pitchFamily="34" charset="0"/>
+              </a:rPr>
+              <a:t>Schliebusch</a:t>
+            </a:r>
+            <a:r>
+              <a:rPr lang="en-US" sz="1600" dirty="0">
+                <a:latin typeface="DejaVu Sans" panose="020B0603030804020204" pitchFamily="34" charset="0"/>
+                <a:ea typeface="DejaVu Sans" panose="020B0603030804020204" pitchFamily="34" charset="0"/>
+                <a:cs typeface="DejaVu Sans" panose="020B0603030804020204" pitchFamily="34" charset="0"/>
+              </a:rPr>
+              <a:t> </a:t>
+            </a:r>
+            <a:r>
+              <a:rPr lang="en-US" sz="1600" dirty="0" smtClean="0">
+                <a:latin typeface="DejaVu Sans" panose="020B0603030804020204" pitchFamily="34" charset="0"/>
+                <a:ea typeface="DejaVu Sans" panose="020B0603030804020204" pitchFamily="34" charset="0"/>
+                <a:cs typeface="DejaVu Sans" panose="020B0603030804020204" pitchFamily="34" charset="0"/>
+              </a:rPr>
+              <a:t>et al. — 2002</a:t>
+            </a:r>
+            <a:r>
+              <a:rPr lang="en-US" sz="1600" dirty="0">
+                <a:latin typeface="DejaVu Sans" panose="020B0603030804020204" pitchFamily="34" charset="0"/>
+                <a:ea typeface="DejaVu Sans" panose="020B0603030804020204" pitchFamily="34" charset="0"/>
+                <a:cs typeface="DejaVu Sans" panose="020B0603030804020204" pitchFamily="34" charset="0"/>
+              </a:rPr>
+              <a:t> — </a:t>
+            </a:r>
+            <a:r>
+              <a:rPr lang="en-US" sz="1600" dirty="0" smtClean="0">
+                <a:latin typeface="DejaVu Sans" panose="020B0603030804020204" pitchFamily="34" charset="0"/>
+                <a:ea typeface="DejaVu Sans" panose="020B0603030804020204" pitchFamily="34" charset="0"/>
+                <a:cs typeface="DejaVu Sans" panose="020B0603030804020204" pitchFamily="34" charset="0"/>
+                <a:hlinkClick r:id="rId3"/>
+              </a:rPr>
+              <a:t>http</a:t>
+            </a:r>
+            <a:r>
+              <a:rPr lang="en-US" sz="1600" dirty="0">
+                <a:latin typeface="DejaVu Sans" panose="020B0603030804020204" pitchFamily="34" charset="0"/>
+                <a:ea typeface="DejaVu Sans" panose="020B0603030804020204" pitchFamily="34" charset="0"/>
+                <a:cs typeface="DejaVu Sans" panose="020B0603030804020204" pitchFamily="34" charset="0"/>
+                <a:hlinkClick r:id="rId3"/>
+              </a:rPr>
+              <a:t>://</a:t>
+            </a:r>
+            <a:r>
+              <a:rPr lang="en-US" sz="1600" dirty="0" smtClean="0">
+                <a:latin typeface="DejaVu Sans" panose="020B0603030804020204" pitchFamily="34" charset="0"/>
+                <a:ea typeface="DejaVu Sans" panose="020B0603030804020204" pitchFamily="34" charset="0"/>
+                <a:cs typeface="DejaVu Sans" panose="020B0603030804020204" pitchFamily="34" charset="0"/>
+                <a:hlinkClick r:id="rId3"/>
+              </a:rPr>
+              <a:t>ieeexplore.ieee.org/lpdocs/epic03/wrapper.htm?arnumber=994928</a:t>
+            </a:r>
+            <a:r>
+              <a:rPr lang="en-US" sz="1600" dirty="0" smtClean="0">
+                <a:latin typeface="DejaVu Sans" panose="020B0603030804020204" pitchFamily="34" charset="0"/>
+                <a:ea typeface="DejaVu Sans" panose="020B0603030804020204" pitchFamily="34" charset="0"/>
+                <a:cs typeface="DejaVu Sans" panose="020B0603030804020204" pitchFamily="34" charset="0"/>
+              </a:rPr>
+              <a:t>.</a:t>
+            </a:r>
+          </a:p>
+          <a:p>
+            <a:pPr marL="342900" indent="-342900">
+              <a:buFont typeface="Arial" pitchFamily="34" charset="0"/>
+              <a:buChar char="•"/>
+            </a:pPr>
+            <a:r>
+              <a:rPr lang="en-US" sz="1600" dirty="0" err="1">
+                <a:latin typeface="DejaVu Sans" panose="020B0603030804020204" pitchFamily="34" charset="0"/>
+                <a:ea typeface="DejaVu Sans" panose="020B0603030804020204" pitchFamily="34" charset="0"/>
+                <a:cs typeface="DejaVu Sans" panose="020B0603030804020204" pitchFamily="34" charset="0"/>
+              </a:rPr>
+              <a:t>Hadjiyiannis</a:t>
+            </a:r>
+            <a:r>
+              <a:rPr lang="en-US" sz="1600" dirty="0">
+                <a:latin typeface="DejaVu Sans" panose="020B0603030804020204" pitchFamily="34" charset="0"/>
+                <a:ea typeface="DejaVu Sans" panose="020B0603030804020204" pitchFamily="34" charset="0"/>
+                <a:cs typeface="DejaVu Sans" panose="020B0603030804020204" pitchFamily="34" charset="0"/>
+              </a:rPr>
+              <a:t> G., </a:t>
+            </a:r>
+            <a:r>
+              <a:rPr lang="en-US" sz="1600" dirty="0" err="1">
+                <a:latin typeface="DejaVu Sans" panose="020B0603030804020204" pitchFamily="34" charset="0"/>
+                <a:ea typeface="DejaVu Sans" panose="020B0603030804020204" pitchFamily="34" charset="0"/>
+                <a:cs typeface="DejaVu Sans" panose="020B0603030804020204" pitchFamily="34" charset="0"/>
+              </a:rPr>
+              <a:t>Hanono</a:t>
+            </a:r>
+            <a:r>
+              <a:rPr lang="en-US" sz="1600" dirty="0">
+                <a:latin typeface="DejaVu Sans" panose="020B0603030804020204" pitchFamily="34" charset="0"/>
+                <a:ea typeface="DejaVu Sans" panose="020B0603030804020204" pitchFamily="34" charset="0"/>
+                <a:cs typeface="DejaVu Sans" panose="020B0603030804020204" pitchFamily="34" charset="0"/>
+              </a:rPr>
+              <a:t> S., </a:t>
+            </a:r>
+            <a:r>
+              <a:rPr lang="en-US" sz="1600" dirty="0" err="1">
+                <a:latin typeface="DejaVu Sans" panose="020B0603030804020204" pitchFamily="34" charset="0"/>
+                <a:ea typeface="DejaVu Sans" panose="020B0603030804020204" pitchFamily="34" charset="0"/>
+                <a:cs typeface="DejaVu Sans" panose="020B0603030804020204" pitchFamily="34" charset="0"/>
+              </a:rPr>
+              <a:t>Devadas</a:t>
+            </a:r>
+            <a:r>
+              <a:rPr lang="en-US" sz="1600" dirty="0">
+                <a:latin typeface="DejaVu Sans" panose="020B0603030804020204" pitchFamily="34" charset="0"/>
+                <a:ea typeface="DejaVu Sans" panose="020B0603030804020204" pitchFamily="34" charset="0"/>
+                <a:cs typeface="DejaVu Sans" panose="020B0603030804020204" pitchFamily="34" charset="0"/>
+              </a:rPr>
+              <a:t> S. ISDL: An </a:t>
+            </a:r>
+            <a:r>
+              <a:rPr lang="en-US" sz="1600" dirty="0" smtClean="0">
+                <a:latin typeface="DejaVu Sans" panose="020B0603030804020204" pitchFamily="34" charset="0"/>
+                <a:ea typeface="DejaVu Sans" panose="020B0603030804020204" pitchFamily="34" charset="0"/>
+                <a:cs typeface="DejaVu Sans" panose="020B0603030804020204" pitchFamily="34" charset="0"/>
+              </a:rPr>
+              <a:t>Instruction Set </a:t>
+            </a:r>
+            <a:r>
+              <a:rPr lang="en-US" sz="1600" dirty="0">
+                <a:latin typeface="DejaVu Sans" panose="020B0603030804020204" pitchFamily="34" charset="0"/>
+                <a:ea typeface="DejaVu Sans" panose="020B0603030804020204" pitchFamily="34" charset="0"/>
+                <a:cs typeface="DejaVu Sans" panose="020B0603030804020204" pitchFamily="34" charset="0"/>
+              </a:rPr>
+              <a:t>Description Language for Retargetability. — </a:t>
+            </a:r>
+            <a:r>
+              <a:rPr lang="en-US" sz="1600" dirty="0" smtClean="0">
+                <a:latin typeface="DejaVu Sans" panose="020B0603030804020204" pitchFamily="34" charset="0"/>
+                <a:ea typeface="DejaVu Sans" panose="020B0603030804020204" pitchFamily="34" charset="0"/>
+                <a:cs typeface="DejaVu Sans" panose="020B0603030804020204" pitchFamily="34" charset="0"/>
+              </a:rPr>
+              <a:t>1997 —   </a:t>
+            </a:r>
+            <a:r>
+              <a:rPr lang="en-US" sz="1600" dirty="0" smtClean="0">
+                <a:latin typeface="DejaVu Sans" panose="020B0603030804020204" pitchFamily="34" charset="0"/>
+                <a:ea typeface="DejaVu Sans" panose="020B0603030804020204" pitchFamily="34" charset="0"/>
+                <a:cs typeface="DejaVu Sans" panose="020B0603030804020204" pitchFamily="34" charset="0"/>
+                <a:hlinkClick r:id="rId4"/>
+              </a:rPr>
+              <a:t>http</a:t>
+            </a:r>
+            <a:r>
+              <a:rPr lang="en-US" sz="1600" dirty="0">
+                <a:latin typeface="DejaVu Sans" panose="020B0603030804020204" pitchFamily="34" charset="0"/>
+                <a:ea typeface="DejaVu Sans" panose="020B0603030804020204" pitchFamily="34" charset="0"/>
+                <a:cs typeface="DejaVu Sans" panose="020B0603030804020204" pitchFamily="34" charset="0"/>
+                <a:hlinkClick r:id="rId4"/>
+              </a:rPr>
+              <a:t>://www.caa.lcs.mit.edu/~</a:t>
+            </a:r>
+            <a:r>
+              <a:rPr lang="en-US" sz="1600" dirty="0" smtClean="0">
+                <a:latin typeface="DejaVu Sans" panose="020B0603030804020204" pitchFamily="34" charset="0"/>
+                <a:ea typeface="DejaVu Sans" panose="020B0603030804020204" pitchFamily="34" charset="0"/>
+                <a:cs typeface="DejaVu Sans" panose="020B0603030804020204" pitchFamily="34" charset="0"/>
+                <a:hlinkClick r:id="rId4"/>
+              </a:rPr>
+              <a:t>devadas/pubs/isdl.ps</a:t>
+            </a:r>
+            <a:r>
+              <a:rPr lang="en-US" sz="1600" dirty="0" smtClean="0">
+                <a:latin typeface="DejaVu Sans" panose="020B0603030804020204" pitchFamily="34" charset="0"/>
+                <a:ea typeface="DejaVu Sans" panose="020B0603030804020204" pitchFamily="34" charset="0"/>
+                <a:cs typeface="DejaVu Sans" panose="020B0603030804020204" pitchFamily="34" charset="0"/>
+              </a:rPr>
+              <a:t>  </a:t>
+            </a:r>
+          </a:p>
+          <a:p>
+            <a:pPr marL="342900" indent="-342900">
+              <a:buFont typeface="Arial" pitchFamily="34" charset="0"/>
+              <a:buChar char="•"/>
+            </a:pPr>
+            <a:endParaRPr lang="ru-RU" sz="1600" dirty="0">
               <a:latin typeface="DejaVu Sans" panose="020B0603030804020204" pitchFamily="34" charset="0"/>
               <a:ea typeface="DejaVu Sans" panose="020B0603030804020204" pitchFamily="34" charset="0"/>
               <a:cs typeface="DejaVu Sans" panose="020B0603030804020204" pitchFamily="34" charset="0"/>
             </a:endParaRPr>
           </a:p>
-          <a:p>
-            <a:pPr marL="342900" indent="-342900">
-              <a:buFont typeface="Arial" pitchFamily="34" charset="0"/>
-              <a:buChar char="•"/>
-            </a:pPr>
-            <a:endParaRPr lang="ru-RU" sz="3200" dirty="0" smtClean="0">
-              <a:latin typeface="DejaVu Sans" panose="020B0603030804020204" pitchFamily="34" charset="0"/>
-              <a:ea typeface="DejaVu Sans" panose="020B0603030804020204" pitchFamily="34" charset="0"/>
-              <a:cs typeface="DejaVu Sans" panose="020B0603030804020204" pitchFamily="34" charset="0"/>
-            </a:endParaRPr>
-          </a:p>
-          <a:p>
-            <a:pPr marL="342900" indent="-342900">
-              <a:buFont typeface="Arial" pitchFamily="34" charset="0"/>
-              <a:buChar char="•"/>
-            </a:pPr>
-            <a:r>
-              <a:rPr lang="ru-RU" sz="3200" dirty="0" smtClean="0">
-                <a:latin typeface="DejaVu Sans" panose="020B0603030804020204" pitchFamily="34" charset="0"/>
-                <a:ea typeface="DejaVu Sans" panose="020B0603030804020204" pitchFamily="34" charset="0"/>
-                <a:cs typeface="DejaVu Sans" panose="020B0603030804020204" pitchFamily="34" charset="0"/>
-              </a:rPr>
-              <a:t>Первоначально предназначался для моделирования, но позже появилась и синтезируемое </a:t>
-            </a:r>
-            <a:r>
-              <a:rPr lang="ru-RU" sz="3200" dirty="0" smtClean="0">
-                <a:latin typeface="DejaVu Sans" panose="020B0603030804020204" pitchFamily="34" charset="0"/>
-                <a:ea typeface="DejaVu Sans" panose="020B0603030804020204" pitchFamily="34" charset="0"/>
-                <a:cs typeface="DejaVu Sans" panose="020B0603030804020204" pitchFamily="34" charset="0"/>
-              </a:rPr>
-              <a:t>подмножество</a:t>
-            </a:r>
-            <a:endParaRPr lang="ru-RU" sz="3200" dirty="0">
-              <a:latin typeface="DejaVu Sans" panose="020B0603030804020204" pitchFamily="34" charset="0"/>
-              <a:ea typeface="DejaVu Sans" panose="020B0603030804020204" pitchFamily="34" charset="0"/>
-              <a:cs typeface="DejaVu Sans" panose="020B0603030804020204" pitchFamily="34" charset="0"/>
-            </a:endParaRPr>
-          </a:p>
         </p:txBody>
       </p:sp>
     </p:spTree>
     <p:extLst>
       <p:ext uri="{BB962C8B-B14F-4D97-AF65-F5344CB8AC3E}">
-        <p14:creationId xmlns:p14="http://schemas.microsoft.com/office/powerpoint/2010/main" val="3776547572"/>
+        <p14:creationId xmlns:p14="http://schemas.microsoft.com/office/powerpoint/2010/main" val="3165969550"/>
       </p:ext>
     </p:extLst>
   </p:cSld>
@@ -6787,7 +6941,7 @@
             </a:pPr>
             <a:r>
               <a:rPr lang="ru-RU" dirty="0" smtClean="0"/>
-              <a:t>Литература</a:t>
+              <a:t>На следующей лекции:</a:t>
             </a:r>
             <a:endParaRPr lang="ru-RU" dirty="0"/>
           </a:p>
@@ -6994,22 +7148,46 @@
       </p:sp>
       <p:sp>
         <p:nvSpPr>
-          <p:cNvPr id="11" name="TextBox 10"/>
+          <p:cNvPr id="7" name="TextBox 6"/>
           <p:cNvSpPr txBox="1"/>
           <p:nvPr/>
         </p:nvSpPr>
         <p:spPr>
           <a:xfrm>
-            <a:off x="395536" y="1547862"/>
-            <a:ext cx="8352928" cy="584775"/>
+            <a:off x="683568" y="1691878"/>
+            <a:ext cx="8208912" cy="369332"/>
+          </a:xfrm>
+          <a:prstGeom prst="rect">
+            <a:avLst/>
+          </a:prstGeom>
+          <a:noFill/>
+        </p:spPr>
+        <p:txBody>
+          <a:bodyPr wrap="square" rtlCol="0">
+            <a:spAutoFit/>
+          </a:bodyPr>
+          <a:lstStyle/>
+          <a:p>
+            <a:endParaRPr lang="ru-RU" dirty="0"/>
+          </a:p>
+        </p:txBody>
+      </p:sp>
+      <p:sp>
+        <p:nvSpPr>
+          <p:cNvPr id="8" name="TextBox 7"/>
+          <p:cNvSpPr txBox="1"/>
+          <p:nvPr/>
+        </p:nvSpPr>
+        <p:spPr>
+          <a:xfrm>
+            <a:off x="1403648" y="2123926"/>
+            <a:ext cx="6336704" cy="646331"/>
           </a:xfrm>
           <a:prstGeom prst="rect">
             <a:avLst/>
           </a:prstGeom>
           <a:ln>
-            <a:solidFill>
-              <a:schemeClr val="bg1"/>
-            </a:solidFill>
+            <a:noFill/>
           </a:ln>
         </p:spPr>
         <p:style>
@@ -7032,11 +7210,23 @@
           </a:bodyPr>
           <a:lstStyle/>
           <a:p>
-            <a:pPr marL="342900" indent="-342900">
-              <a:buFont typeface="Arial" pitchFamily="34" charset="0"/>
-              <a:buChar char="•"/>
-            </a:pPr>
-            <a:endParaRPr lang="ru-RU" sz="3200" dirty="0">
+            <a:r>
+              <a:rPr lang="ru-RU" sz="3600" dirty="0" smtClean="0">
+                <a:latin typeface="DejaVu Sans" panose="020B0603030804020204" pitchFamily="34" charset="0"/>
+                <a:ea typeface="DejaVu Sans" panose="020B0603030804020204" pitchFamily="34" charset="0"/>
+                <a:cs typeface="DejaVu Sans" panose="020B0603030804020204" pitchFamily="34" charset="0"/>
+              </a:rPr>
+              <a:t>Контрольная </a:t>
+            </a:r>
+            <a:r>
+              <a:rPr lang="ru-RU" sz="3600" dirty="0" smtClean="0">
+                <a:latin typeface="DejaVu Sans" panose="020B0603030804020204" pitchFamily="34" charset="0"/>
+                <a:ea typeface="DejaVu Sans" panose="020B0603030804020204" pitchFamily="34" charset="0"/>
+                <a:cs typeface="DejaVu Sans" panose="020B0603030804020204" pitchFamily="34" charset="0"/>
+              </a:rPr>
+              <a:t>работа</a:t>
+            </a:r>
+            <a:endParaRPr lang="ru-RU" sz="3600" dirty="0" smtClean="0">
               <a:latin typeface="DejaVu Sans" panose="020B0603030804020204" pitchFamily="34" charset="0"/>
               <a:ea typeface="DejaVu Sans" panose="020B0603030804020204" pitchFamily="34" charset="0"/>
               <a:cs typeface="DejaVu Sans" panose="020B0603030804020204" pitchFamily="34" charset="0"/>
@@ -7047,7 +7237,7 @@
     </p:spTree>
     <p:extLst>
       <p:ext uri="{BB962C8B-B14F-4D97-AF65-F5344CB8AC3E}">
-        <p14:creationId xmlns:p14="http://schemas.microsoft.com/office/powerpoint/2010/main" val="3165969550"/>
+        <p14:creationId xmlns:p14="http://schemas.microsoft.com/office/powerpoint/2010/main" val="696775118"/>
       </p:ext>
     </p:extLst>
   </p:cSld>
@@ -7074,7 +7264,7 @@
 
 <file path=ppt/slides/slide18.xml><?xml version="1.0" encoding="utf-8"?>
 <p:sld xmlns:a="http://schemas.openxmlformats.org/drawingml/2006/main" xmlns:r="http://schemas.openxmlformats.org/officeDocument/2006/relationships" xmlns:p="http://schemas.openxmlformats.org/presentationml/2006/main">
-  <p:cSld>
+  <p:cSld name="Slide19">
     <p:spTree>
       <p:nvGrpSpPr>
         <p:cNvPr id="1" name=""/>
@@ -7108,23 +7298,22 @@
               <a:buNone/>
             </a:pPr>
             <a:r>
-              <a:rPr lang="ru-RU" dirty="0" smtClean="0"/>
-              <a:t>На следующей лекции:</a:t>
-            </a:r>
-            <a:endParaRPr lang="ru-RU" dirty="0"/>
-          </a:p>
-        </p:txBody>
-      </p:sp>
-      <p:sp>
-        <p:nvSpPr>
-          <p:cNvPr id="3" name="Date Placeholder 2"/>
-          <p:cNvSpPr txBox="1"/>
+              <a:rPr lang="ru-RU"/>
+              <a:t>Спасибо за внимание!</a:t>
+            </a:r>
+          </a:p>
+        </p:txBody>
+      </p:sp>
+      <p:sp>
+        <p:nvSpPr>
+          <p:cNvPr id="3" name="Rectangle 7"/>
+          <p:cNvSpPr/>
           <p:nvPr/>
         </p:nvSpPr>
         <p:spPr>
           <a:xfrm>
-            <a:off x="107643" y="5292364"/>
-            <a:ext cx="1007997" cy="302757"/>
+            <a:off x="395642" y="3636001"/>
+            <a:ext cx="7920359" cy="645118"/>
           </a:xfrm>
           <a:prstGeom prst="rect">
             <a:avLst/>
@@ -7132,10 +7321,13 @@
           <a:noFill/>
           <a:ln>
             <a:noFill/>
+            <a:prstDash val="solid"/>
           </a:ln>
         </p:spPr>
         <p:txBody>
-          <a:bodyPr vert="horz" wrap="square" lIns="91440" tIns="45720" rIns="91440" bIns="45720" anchor="t" anchorCtr="0" compatLnSpc="0"/>
+          <a:bodyPr vert="horz" wrap="square" lIns="91440" tIns="45720" rIns="91440" bIns="45720" anchor="t" anchorCtr="0" compatLnSpc="0">
+            <a:spAutoFit/>
+          </a:bodyPr>
           <a:lstStyle/>
           <a:p>
             <a:pPr marL="0" marR="0" lvl="0" indent="0" algn="l" defTabSz="914400" rtl="0" fontAlgn="auto" hangingPunct="1">
@@ -7157,7 +7349,136 @@
                 <a:uFillTx/>
               </a:defRPr>
             </a:pPr>
-            <a:fld id="{C2DCE42C-1AC3-4409-BB7E-5371C59504E4}" type="datetime1">
+            <a:r>
+              <a:rPr lang="ru-RU" sz="1800" b="0" i="0" u="none" strike="noStrike" kern="1200" cap="none" spc="0" baseline="0">
+                <a:solidFill>
+                  <a:srgbClr val="000000"/>
+                </a:solidFill>
+                <a:uFillTx/>
+                <a:latin typeface="DejaVu Sans" pitchFamily="34"/>
+                <a:ea typeface="DejaVu Sans" pitchFamily="34"/>
+                <a:cs typeface="DejaVu Sans" pitchFamily="34"/>
+              </a:rPr>
+              <a:t>Все материалы курса выкладываются на сайте лаборатории:</a:t>
+            </a:r>
+          </a:p>
+          <a:p>
+            <a:pPr marL="0" marR="0" lvl="0" indent="0" algn="l" defTabSz="914400" rtl="0" fontAlgn="auto" hangingPunct="1">
+              <a:lnSpc>
+                <a:spcPct val="100000"/>
+              </a:lnSpc>
+              <a:spcBef>
+                <a:spcPts val="0"/>
+              </a:spcBef>
+              <a:spcAft>
+                <a:spcPts val="0"/>
+              </a:spcAft>
+              <a:buNone/>
+              <a:tabLst/>
+              <a:defRPr sz="1800" b="0" i="0" u="none" strike="noStrike" kern="0" cap="none" spc="0" baseline="0">
+                <a:solidFill>
+                  <a:srgbClr val="000000"/>
+                </a:solidFill>
+                <a:uFillTx/>
+              </a:defRPr>
+            </a:pPr>
+            <a:r>
+              <a:rPr lang="en-US" sz="2000" b="1" i="0" u="sng" strike="noStrike" kern="1200" cap="none" spc="0" baseline="0">
+                <a:solidFill>
+                  <a:srgbClr val="0000FF"/>
+                </a:solidFill>
+                <a:uFillTx/>
+                <a:latin typeface="Courier New" pitchFamily="49"/>
+                <a:ea typeface="Microsoft YaHei" pitchFamily="2"/>
+                <a:cs typeface="Courier New" pitchFamily="49"/>
+                <a:hlinkClick r:id="rId3"/>
+              </a:rPr>
+              <a:t>http://iscalare.mipt.ru/material/course_materials/</a:t>
+            </a:r>
+          </a:p>
+        </p:txBody>
+      </p:sp>
+      <p:sp>
+        <p:nvSpPr>
+          <p:cNvPr id="4" name="Content Placeholder 2"/>
+          <p:cNvSpPr txBox="1">
+            <a:spLocks noGrp="1"/>
+          </p:cNvSpPr>
+          <p:nvPr>
+            <p:ph type="body" idx="4294967295"/>
+          </p:nvPr>
+        </p:nvSpPr>
+        <p:spPr>
+          <a:xfrm>
+            <a:off x="113403" y="4716356"/>
+            <a:ext cx="9012600" cy="434157"/>
+          </a:xfrm>
+        </p:spPr>
+        <p:txBody>
+          <a:bodyPr/>
+          <a:lstStyle/>
+          <a:p>
+            <a:pPr lvl="0">
+              <a:spcBef>
+                <a:spcPts val="200"/>
+              </a:spcBef>
+              <a:spcAft>
+                <a:spcPts val="0"/>
+              </a:spcAft>
+              <a:buNone/>
+            </a:pPr>
+            <a:r>
+              <a:rPr lang="ru-RU" sz="900">
+                <a:latin typeface="DejaVu Sans" pitchFamily="34"/>
+              </a:rPr>
+              <a:t>Замечание: все торговые марки и логотипы, использованные в данном материале, являются собственностью их владельцев. Представленная здесь точка зрения отражает личное мнение автора, не выступающего от лица какой-либо организации.</a:t>
+            </a:r>
+          </a:p>
+        </p:txBody>
+      </p:sp>
+      <p:sp>
+        <p:nvSpPr>
+          <p:cNvPr id="5" name="Date Placeholder 2"/>
+          <p:cNvSpPr txBox="1"/>
+          <p:nvPr/>
+        </p:nvSpPr>
+        <p:spPr>
+          <a:xfrm>
+            <a:off x="107643" y="5292364"/>
+            <a:ext cx="1007997" cy="302757"/>
+          </a:xfrm>
+          <a:prstGeom prst="rect">
+            <a:avLst/>
+          </a:prstGeom>
+          <a:noFill/>
+          <a:ln>
+            <a:noFill/>
+          </a:ln>
+        </p:spPr>
+        <p:txBody>
+          <a:bodyPr vert="horz" wrap="square" lIns="91440" tIns="45720" rIns="91440" bIns="45720" anchor="t" anchorCtr="0" compatLnSpc="0"/>
+          <a:lstStyle/>
+          <a:p>
+            <a:pPr marL="0" marR="0" lvl="0" indent="0" algn="l" defTabSz="914400" rtl="0" fontAlgn="auto" hangingPunct="1">
+              <a:lnSpc>
+                <a:spcPct val="100000"/>
+              </a:lnSpc>
+              <a:spcBef>
+                <a:spcPts val="0"/>
+              </a:spcBef>
+              <a:spcAft>
+                <a:spcPts val="0"/>
+              </a:spcAft>
+              <a:buNone/>
+              <a:tabLst/>
+              <a:defRPr sz="1800" b="0" i="0" u="none" strike="noStrike" kern="0" cap="none" spc="0" baseline="0">
+                <a:solidFill>
+                  <a:srgbClr val="000000"/>
+                </a:solidFill>
+                <a:uFillTx/>
+              </a:defRPr>
+            </a:pPr>
+            <a:fld id="{C02EB250-71C8-42D3-8A38-532913F43000}" type="datetime1">
               <a:rPr lang="ru-RU" sz="1200" b="0" i="0" u="none" strike="noStrike" kern="1200" cap="none" spc="0" baseline="0">
                 <a:solidFill>
                   <a:srgbClr val="000000"/>
@@ -7202,495 +7523,6 @@
       </p:sp>
       <p:sp>
         <p:nvSpPr>
-          <p:cNvPr id="4" name="Footer Placeholder 3"/>
-          <p:cNvSpPr txBox="1"/>
-          <p:nvPr/>
-        </p:nvSpPr>
-        <p:spPr>
-          <a:xfrm>
-            <a:off x="1043641" y="5271122"/>
-            <a:ext cx="7108920" cy="302757"/>
-          </a:xfrm>
-          <a:prstGeom prst="rect">
-            <a:avLst/>
-          </a:prstGeom>
-          <a:noFill/>
-          <a:ln>
-            <a:noFill/>
-          </a:ln>
-        </p:spPr>
-        <p:txBody>
-          <a:bodyPr vert="horz" wrap="square" lIns="91440" tIns="45720" rIns="91440" bIns="45720" anchor="t" anchorCtr="1" compatLnSpc="0"/>
-          <a:lstStyle/>
-          <a:p>
-            <a:pPr marL="0" marR="0" lvl="0" indent="0" algn="ctr" defTabSz="914400" rtl="0" fontAlgn="auto" hangingPunct="1">
-              <a:lnSpc>
-                <a:spcPct val="100000"/>
-              </a:lnSpc>
-              <a:spcBef>
-                <a:spcPts val="0"/>
-              </a:spcBef>
-              <a:spcAft>
-                <a:spcPts val="0"/>
-              </a:spcAft>
-              <a:buNone/>
-              <a:tabLst/>
-              <a:defRPr sz="1800" b="0" i="0" u="none" strike="noStrike" kern="0" cap="none" spc="0" baseline="0">
-                <a:solidFill>
-                  <a:srgbClr val="000000"/>
-                </a:solidFill>
-                <a:uFillTx/>
-              </a:defRPr>
-            </a:pPr>
-            <a:r>
-              <a:rPr lang="ru-RU" sz="1200" b="0" i="0" u="none" strike="noStrike" kern="1200" cap="none" spc="0" baseline="0">
-                <a:solidFill>
-                  <a:srgbClr val="000000"/>
-                </a:solidFill>
-                <a:uFillTx/>
-                <a:latin typeface="Arial" pitchFamily="34"/>
-                <a:ea typeface="WenQuanYi Zen Hei" pitchFamily="2"/>
-                <a:cs typeface="Arial" pitchFamily="34"/>
-              </a:rPr>
-              <a:t>Лаборатория суперкомпьютерных технологий для биомедицины, фармакологии и малоразмерных структур</a:t>
-            </a:r>
-          </a:p>
-        </p:txBody>
-      </p:sp>
-      <p:sp>
-        <p:nvSpPr>
-          <p:cNvPr id="5" name="Slide Number Placeholder 4"/>
-          <p:cNvSpPr txBox="1"/>
-          <p:nvPr/>
-        </p:nvSpPr>
-        <p:spPr>
-          <a:xfrm>
-            <a:off x="8460357" y="5292364"/>
-            <a:ext cx="515154" cy="302757"/>
-          </a:xfrm>
-          <a:prstGeom prst="rect">
-            <a:avLst/>
-          </a:prstGeom>
-          <a:noFill/>
-          <a:ln>
-            <a:noFill/>
-          </a:ln>
-        </p:spPr>
-        <p:txBody>
-          <a:bodyPr vert="horz" wrap="square" lIns="91440" tIns="45720" rIns="91440" bIns="45720" anchor="t" anchorCtr="0" compatLnSpc="0"/>
-          <a:lstStyle/>
-          <a:p>
-            <a:pPr marL="0" marR="0" lvl="0" indent="0" algn="l" defTabSz="914400" rtl="0" fontAlgn="auto" hangingPunct="1">
-              <a:lnSpc>
-                <a:spcPct val="100000"/>
-              </a:lnSpc>
-              <a:spcBef>
-                <a:spcPts val="0"/>
-              </a:spcBef>
-              <a:spcAft>
-                <a:spcPts val="0"/>
-              </a:spcAft>
-              <a:buNone/>
-              <a:tabLst/>
-              <a:defRPr sz="1800" b="0" i="0" u="none" strike="noStrike" kern="0" cap="none" spc="0" baseline="0">
-                <a:solidFill>
-                  <a:srgbClr val="000000"/>
-                </a:solidFill>
-                <a:uFillTx/>
-              </a:defRPr>
-            </a:pPr>
-            <a:fld id="{82045C0D-E460-4CA0-80AA-3B684EFF4D9A}" type="slidenum">
-              <a:t>18</a:t>
-            </a:fld>
-            <a:endParaRPr lang="ru-RU" sz="1400" b="0" i="0" u="none" strike="noStrike" kern="1200" cap="none" spc="0" baseline="0">
-              <a:solidFill>
-                <a:srgbClr val="000000"/>
-              </a:solidFill>
-              <a:uFillTx/>
-              <a:latin typeface="Calibri" pitchFamily="18"/>
-              <a:ea typeface="WenQuanYi Zen Hei" pitchFamily="2"/>
-              <a:cs typeface="Lohit Hindi" pitchFamily="2"/>
-            </a:endParaRPr>
-          </a:p>
-        </p:txBody>
-      </p:sp>
-      <p:sp>
-        <p:nvSpPr>
-          <p:cNvPr id="7" name="TextBox 6"/>
-          <p:cNvSpPr txBox="1"/>
-          <p:nvPr/>
-        </p:nvSpPr>
-        <p:spPr>
-          <a:xfrm>
-            <a:off x="683568" y="1691878"/>
-            <a:ext cx="8208912" cy="369332"/>
-          </a:xfrm>
-          <a:prstGeom prst="rect">
-            <a:avLst/>
-          </a:prstGeom>
-          <a:noFill/>
-        </p:spPr>
-        <p:txBody>
-          <a:bodyPr wrap="square" rtlCol="0">
-            <a:spAutoFit/>
-          </a:bodyPr>
-          <a:lstStyle/>
-          <a:p>
-            <a:endParaRPr lang="ru-RU" dirty="0"/>
-          </a:p>
-        </p:txBody>
-      </p:sp>
-      <p:sp>
-        <p:nvSpPr>
-          <p:cNvPr id="8" name="TextBox 7"/>
-          <p:cNvSpPr txBox="1"/>
-          <p:nvPr/>
-        </p:nvSpPr>
-        <p:spPr>
-          <a:xfrm>
-            <a:off x="1403648" y="2123926"/>
-            <a:ext cx="6336704" cy="646331"/>
-          </a:xfrm>
-          <a:prstGeom prst="rect">
-            <a:avLst/>
-          </a:prstGeom>
-          <a:ln>
-            <a:noFill/>
-          </a:ln>
-        </p:spPr>
-        <p:style>
-          <a:lnRef idx="2">
-            <a:schemeClr val="dk1"/>
-          </a:lnRef>
-          <a:fillRef idx="1">
-            <a:schemeClr val="lt1"/>
-          </a:fillRef>
-          <a:effectRef idx="0">
-            <a:schemeClr val="dk1"/>
-          </a:effectRef>
-          <a:fontRef idx="minor">
-            <a:schemeClr val="dk1"/>
-          </a:fontRef>
-        </p:style>
-        <p:txBody>
-          <a:bodyPr wrap="square" rtlCol="0">
-            <a:spAutoFit/>
-          </a:bodyPr>
-          <a:lstStyle/>
-          <a:p>
-            <a:r>
-              <a:rPr lang="ru-RU" sz="3600" dirty="0" smtClean="0">
-                <a:latin typeface="DejaVu Sans" panose="020B0603030804020204" pitchFamily="34" charset="0"/>
-                <a:ea typeface="DejaVu Sans" panose="020B0603030804020204" pitchFamily="34" charset="0"/>
-                <a:cs typeface="DejaVu Sans" panose="020B0603030804020204" pitchFamily="34" charset="0"/>
-              </a:rPr>
-              <a:t>Контрольная </a:t>
-            </a:r>
-            <a:r>
-              <a:rPr lang="ru-RU" sz="3600" dirty="0" smtClean="0">
-                <a:latin typeface="DejaVu Sans" panose="020B0603030804020204" pitchFamily="34" charset="0"/>
-                <a:ea typeface="DejaVu Sans" panose="020B0603030804020204" pitchFamily="34" charset="0"/>
-                <a:cs typeface="DejaVu Sans" panose="020B0603030804020204" pitchFamily="34" charset="0"/>
-              </a:rPr>
-              <a:t>работа</a:t>
-            </a:r>
-            <a:endParaRPr lang="ru-RU" sz="3600" dirty="0" smtClean="0">
-              <a:latin typeface="DejaVu Sans" panose="020B0603030804020204" pitchFamily="34" charset="0"/>
-              <a:ea typeface="DejaVu Sans" panose="020B0603030804020204" pitchFamily="34" charset="0"/>
-              <a:cs typeface="DejaVu Sans" panose="020B0603030804020204" pitchFamily="34" charset="0"/>
-            </a:endParaRPr>
-          </a:p>
-        </p:txBody>
-      </p:sp>
-    </p:spTree>
-    <p:extLst>
-      <p:ext uri="{BB962C8B-B14F-4D97-AF65-F5344CB8AC3E}">
-        <p14:creationId xmlns:p14="http://schemas.microsoft.com/office/powerpoint/2010/main" val="696775118"/>
-      </p:ext>
-    </p:extLst>
-  </p:cSld>
-  <p:clrMapOvr>
-    <a:masterClrMapping/>
-  </p:clrMapOvr>
-  <mc:AlternateContent xmlns:mc="http://schemas.openxmlformats.org/markup-compatibility/2006" xmlns:p14="http://schemas.microsoft.com/office/powerpoint/2010/main">
-    <mc:Choice Requires="p14">
-      <p:transition spd="slow" p14:dur="2000"/>
-    </mc:Choice>
-    <mc:Fallback xmlns="">
-      <p:transition spd="slow"/>
-    </mc:Fallback>
-  </mc:AlternateContent>
-  <p:timing>
-    <p:tnLst>
-      <p:par>
-        <p:cTn id="1" dur="indefinite" restart="never" nodeType="tmRoot"/>
-      </p:par>
-    </p:tnLst>
-  </p:timing>
-</p:sld>
-</file>
-
-<file path=ppt/slides/slide19.xml><?xml version="1.0" encoding="utf-8"?>
-<p:sld xmlns:a="http://schemas.openxmlformats.org/drawingml/2006/main" xmlns:r="http://schemas.openxmlformats.org/officeDocument/2006/relationships" xmlns:p="http://schemas.openxmlformats.org/presentationml/2006/main">
-  <p:cSld name="Slide19">
-    <p:spTree>
-      <p:nvGrpSpPr>
-        <p:cNvPr id="1" name=""/>
-        <p:cNvGrpSpPr/>
-        <p:nvPr/>
-      </p:nvGrpSpPr>
-      <p:grpSpPr>
-        <a:xfrm>
-          <a:off x="0" y="0"/>
-          <a:ext cx="0" cy="0"/>
-          <a:chOff x="0" y="0"/>
-          <a:chExt cx="0" cy="0"/>
-        </a:xfrm>
-      </p:grpSpPr>
-      <p:sp>
-        <p:nvSpPr>
-          <p:cNvPr id="2" name="Title 1"/>
-          <p:cNvSpPr txBox="1">
-            <a:spLocks noGrp="1"/>
-          </p:cNvSpPr>
-          <p:nvPr>
-            <p:ph type="title"/>
-          </p:nvPr>
-        </p:nvSpPr>
-        <p:spPr/>
-        <p:txBody>
-          <a:bodyPr/>
-          <a:lstStyle/>
-          <a:p>
-            <a:pPr lvl="0">
-              <a:buNone/>
-            </a:pPr>
-            <a:r>
-              <a:rPr lang="ru-RU"/>
-              <a:t>Спасибо за внимание!</a:t>
-            </a:r>
-          </a:p>
-        </p:txBody>
-      </p:sp>
-      <p:sp>
-        <p:nvSpPr>
-          <p:cNvPr id="3" name="Rectangle 7"/>
-          <p:cNvSpPr/>
-          <p:nvPr/>
-        </p:nvSpPr>
-        <p:spPr>
-          <a:xfrm>
-            <a:off x="395642" y="3636001"/>
-            <a:ext cx="7920359" cy="645118"/>
-          </a:xfrm>
-          <a:prstGeom prst="rect">
-            <a:avLst/>
-          </a:prstGeom>
-          <a:noFill/>
-          <a:ln>
-            <a:noFill/>
-            <a:prstDash val="solid"/>
-          </a:ln>
-        </p:spPr>
-        <p:txBody>
-          <a:bodyPr vert="horz" wrap="square" lIns="91440" tIns="45720" rIns="91440" bIns="45720" anchor="t" anchorCtr="0" compatLnSpc="0">
-            <a:spAutoFit/>
-          </a:bodyPr>
-          <a:lstStyle/>
-          <a:p>
-            <a:pPr marL="0" marR="0" lvl="0" indent="0" algn="l" defTabSz="914400" rtl="0" fontAlgn="auto" hangingPunct="1">
-              <a:lnSpc>
-                <a:spcPct val="100000"/>
-              </a:lnSpc>
-              <a:spcBef>
-                <a:spcPts val="0"/>
-              </a:spcBef>
-              <a:spcAft>
-                <a:spcPts val="0"/>
-              </a:spcAft>
-              <a:buNone/>
-              <a:tabLst/>
-              <a:defRPr sz="1800" b="0" i="0" u="none" strike="noStrike" kern="0" cap="none" spc="0" baseline="0">
-                <a:solidFill>
-                  <a:srgbClr val="000000"/>
-                </a:solidFill>
-                <a:uFillTx/>
-              </a:defRPr>
-            </a:pPr>
-            <a:r>
-              <a:rPr lang="ru-RU" sz="1800" b="0" i="0" u="none" strike="noStrike" kern="1200" cap="none" spc="0" baseline="0">
-                <a:solidFill>
-                  <a:srgbClr val="000000"/>
-                </a:solidFill>
-                <a:uFillTx/>
-                <a:latin typeface="DejaVu Sans" pitchFamily="34"/>
-                <a:ea typeface="DejaVu Sans" pitchFamily="34"/>
-                <a:cs typeface="DejaVu Sans" pitchFamily="34"/>
-              </a:rPr>
-              <a:t>Все материалы курса выкладываются на сайте лаборатории:</a:t>
-            </a:r>
-          </a:p>
-          <a:p>
-            <a:pPr marL="0" marR="0" lvl="0" indent="0" algn="l" defTabSz="914400" rtl="0" fontAlgn="auto" hangingPunct="1">
-              <a:lnSpc>
-                <a:spcPct val="100000"/>
-              </a:lnSpc>
-              <a:spcBef>
-                <a:spcPts val="0"/>
-              </a:spcBef>
-              <a:spcAft>
-                <a:spcPts val="0"/>
-              </a:spcAft>
-              <a:buNone/>
-              <a:tabLst/>
-              <a:defRPr sz="1800" b="0" i="0" u="none" strike="noStrike" kern="0" cap="none" spc="0" baseline="0">
-                <a:solidFill>
-                  <a:srgbClr val="000000"/>
-                </a:solidFill>
-                <a:uFillTx/>
-              </a:defRPr>
-            </a:pPr>
-            <a:r>
-              <a:rPr lang="en-US" sz="2000" b="1" i="0" u="sng" strike="noStrike" kern="1200" cap="none" spc="0" baseline="0">
-                <a:solidFill>
-                  <a:srgbClr val="0000FF"/>
-                </a:solidFill>
-                <a:uFillTx/>
-                <a:latin typeface="Courier New" pitchFamily="49"/>
-                <a:ea typeface="Microsoft YaHei" pitchFamily="2"/>
-                <a:cs typeface="Courier New" pitchFamily="49"/>
-                <a:hlinkClick r:id="rId3"/>
-              </a:rPr>
-              <a:t>http://iscalare.mipt.ru/material/course_materials/</a:t>
-            </a:r>
-          </a:p>
-        </p:txBody>
-      </p:sp>
-      <p:sp>
-        <p:nvSpPr>
-          <p:cNvPr id="4" name="Content Placeholder 2"/>
-          <p:cNvSpPr txBox="1">
-            <a:spLocks noGrp="1"/>
-          </p:cNvSpPr>
-          <p:nvPr>
-            <p:ph type="body" idx="4294967295"/>
-          </p:nvPr>
-        </p:nvSpPr>
-        <p:spPr>
-          <a:xfrm>
-            <a:off x="113403" y="4716356"/>
-            <a:ext cx="9012600" cy="434157"/>
-          </a:xfrm>
-        </p:spPr>
-        <p:txBody>
-          <a:bodyPr/>
-          <a:lstStyle/>
-          <a:p>
-            <a:pPr lvl="0">
-              <a:spcBef>
-                <a:spcPts val="200"/>
-              </a:spcBef>
-              <a:spcAft>
-                <a:spcPts val="0"/>
-              </a:spcAft>
-              <a:buNone/>
-            </a:pPr>
-            <a:r>
-              <a:rPr lang="ru-RU" sz="900">
-                <a:latin typeface="DejaVu Sans" pitchFamily="34"/>
-              </a:rPr>
-              <a:t>Замечание: все торговые марки и логотипы, использованные в данном материале, являются собственностью их владельцев. Представленная здесь точка зрения отражает личное мнение автора, не выступающего от лица какой-либо организации.</a:t>
-            </a:r>
-          </a:p>
-        </p:txBody>
-      </p:sp>
-      <p:sp>
-        <p:nvSpPr>
-          <p:cNvPr id="5" name="Date Placeholder 2"/>
-          <p:cNvSpPr txBox="1"/>
-          <p:nvPr/>
-        </p:nvSpPr>
-        <p:spPr>
-          <a:xfrm>
-            <a:off x="107643" y="5292364"/>
-            <a:ext cx="1007997" cy="302757"/>
-          </a:xfrm>
-          <a:prstGeom prst="rect">
-            <a:avLst/>
-          </a:prstGeom>
-          <a:noFill/>
-          <a:ln>
-            <a:noFill/>
-          </a:ln>
-        </p:spPr>
-        <p:txBody>
-          <a:bodyPr vert="horz" wrap="square" lIns="91440" tIns="45720" rIns="91440" bIns="45720" anchor="t" anchorCtr="0" compatLnSpc="0"/>
-          <a:lstStyle/>
-          <a:p>
-            <a:pPr marL="0" marR="0" lvl="0" indent="0" algn="l" defTabSz="914400" rtl="0" fontAlgn="auto" hangingPunct="1">
-              <a:lnSpc>
-                <a:spcPct val="100000"/>
-              </a:lnSpc>
-              <a:spcBef>
-                <a:spcPts val="0"/>
-              </a:spcBef>
-              <a:spcAft>
-                <a:spcPts val="0"/>
-              </a:spcAft>
-              <a:buNone/>
-              <a:tabLst/>
-              <a:defRPr sz="1800" b="0" i="0" u="none" strike="noStrike" kern="0" cap="none" spc="0" baseline="0">
-                <a:solidFill>
-                  <a:srgbClr val="000000"/>
-                </a:solidFill>
-                <a:uFillTx/>
-              </a:defRPr>
-            </a:pPr>
-            <a:fld id="{C02EB250-71C8-42D3-8A38-532913F43000}" type="datetime1">
-              <a:rPr lang="ru-RU" sz="1200" b="0" i="0" u="none" strike="noStrike" kern="1200" cap="none" spc="0" baseline="0">
-                <a:solidFill>
-                  <a:srgbClr val="000000"/>
-                </a:solidFill>
-                <a:uFillTx/>
-                <a:latin typeface="Arial" pitchFamily="34"/>
-                <a:ea typeface="WenQuanYi Zen Hei" pitchFamily="2"/>
-                <a:cs typeface="Arial" pitchFamily="34"/>
-              </a:rPr>
-              <a:pPr marL="0" marR="0" lvl="0" indent="0" algn="l" defTabSz="914400" rtl="0" fontAlgn="auto" hangingPunct="1">
-                <a:lnSpc>
-                  <a:spcPct val="100000"/>
-                </a:lnSpc>
-                <a:spcBef>
-                  <a:spcPts val="0"/>
-                </a:spcBef>
-                <a:spcAft>
-                  <a:spcPts val="0"/>
-                </a:spcAft>
-                <a:buNone/>
-                <a:tabLst/>
-                <a:defRPr sz="1800" b="0" i="0" u="none" strike="noStrike" kern="0" cap="none" spc="0" baseline="0">
-                  <a:solidFill>
-                    <a:srgbClr val="000000"/>
-                  </a:solidFill>
-                  <a:uFillTx/>
-                </a:defRPr>
-              </a:pPr>
-              <a:t>06.05.2014</a:t>
-            </a:fld>
-            <a:endParaRPr lang="ru-RU" sz="1200" b="0" i="0" u="none" strike="noStrike" kern="1200" cap="none" spc="0" baseline="0">
-              <a:solidFill>
-                <a:srgbClr val="000000"/>
-              </a:solidFill>
-              <a:uFillTx/>
-              <a:latin typeface="Arial" pitchFamily="34"/>
-              <a:ea typeface="WenQuanYi Zen Hei" pitchFamily="2"/>
-              <a:cs typeface="Arial" pitchFamily="34"/>
-            </a:endParaRPr>
-          </a:p>
-        </p:txBody>
-      </p:sp>
-      <p:sp>
-        <p:nvSpPr>
           <p:cNvPr id="6" name="Footer Placeholder 3"/>
           <p:cNvSpPr txBox="1"/>
           <p:nvPr/>
@@ -7789,7 +7621,7 @@
               </a:defRPr>
             </a:pPr>
             <a:fld id="{C3927B34-4DBF-4201-BD14-277E14BBAA94}" type="slidenum">
-              <a:t>19</a:t>
+              <a:t>18</a:t>
             </a:fld>
             <a:endParaRPr lang="ru-RU" sz="1400" b="0" i="0" u="none" strike="noStrike" kern="1200" cap="none" spc="0" baseline="0">
               <a:solidFill>
@@ -8552,7 +8384,7 @@
 
 <file path=ppt/slides/slide4.xml><?xml version="1.0" encoding="utf-8"?>
 <p:sld xmlns:a="http://schemas.openxmlformats.org/drawingml/2006/main" xmlns:r="http://schemas.openxmlformats.org/officeDocument/2006/relationships" xmlns:p="http://schemas.openxmlformats.org/presentationml/2006/main">
-  <p:cSld name="Slide21">
+  <p:cSld>
     <p:spTree>
       <p:nvGrpSpPr>
         <p:cNvPr id="1" name=""/>
@@ -8587,7 +8419,7 @@
             </a:pPr>
             <a:r>
               <a:rPr lang="ru-RU" dirty="0" smtClean="0"/>
-              <a:t>Классификация компонент:</a:t>
+              <a:t>Вопрос</a:t>
             </a:r>
             <a:endParaRPr lang="ru-RU" dirty="0"/>
           </a:p>
@@ -8779,6 +8611,325 @@
             </a:pPr>
             <a:fld id="{82045C0D-E460-4CA0-80AA-3B684EFF4D9A}" type="slidenum">
               <a:t>4</a:t>
+            </a:fld>
+            <a:endParaRPr lang="ru-RU" sz="1400" b="0" i="0" u="none" strike="noStrike" kern="1200" cap="none" spc="0" baseline="0">
+              <a:solidFill>
+                <a:srgbClr val="000000"/>
+              </a:solidFill>
+              <a:uFillTx/>
+              <a:latin typeface="Calibri" pitchFamily="18"/>
+              <a:ea typeface="WenQuanYi Zen Hei" pitchFamily="2"/>
+              <a:cs typeface="Lohit Hindi" pitchFamily="2"/>
+            </a:endParaRPr>
+          </a:p>
+        </p:txBody>
+      </p:sp>
+      <p:sp>
+        <p:nvSpPr>
+          <p:cNvPr id="7" name="TextBox 6"/>
+          <p:cNvSpPr txBox="1"/>
+          <p:nvPr/>
+        </p:nvSpPr>
+        <p:spPr>
+          <a:xfrm>
+            <a:off x="457200" y="1547862"/>
+            <a:ext cx="8229600" cy="1754326"/>
+          </a:xfrm>
+          <a:prstGeom prst="rect">
+            <a:avLst/>
+          </a:prstGeom>
+          <a:ln>
+            <a:noFill/>
+          </a:ln>
+        </p:spPr>
+        <p:style>
+          <a:lnRef idx="2">
+            <a:schemeClr val="dk1"/>
+          </a:lnRef>
+          <a:fillRef idx="1">
+            <a:schemeClr val="lt1"/>
+          </a:fillRef>
+          <a:effectRef idx="0">
+            <a:schemeClr val="dk1"/>
+          </a:effectRef>
+          <a:fontRef idx="minor">
+            <a:schemeClr val="dk1"/>
+          </a:fontRef>
+        </p:style>
+        <p:txBody>
+          <a:bodyPr wrap="square" rtlCol="0">
+            <a:spAutoFit/>
+          </a:bodyPr>
+          <a:lstStyle/>
+          <a:p>
+            <a:r>
+              <a:rPr lang="ru-RU" sz="3600" dirty="0" smtClean="0">
+                <a:latin typeface="DejaVu Sans" panose="020B0603030804020204" pitchFamily="34" charset="0"/>
+                <a:ea typeface="DejaVu Sans" panose="020B0603030804020204" pitchFamily="34" charset="0"/>
+                <a:cs typeface="DejaVu Sans" panose="020B0603030804020204" pitchFamily="34" charset="0"/>
+              </a:rPr>
+              <a:t>На каком языке программирования должен быть написан симулятор?</a:t>
+            </a:r>
+          </a:p>
+        </p:txBody>
+      </p:sp>
+    </p:spTree>
+    <p:extLst>
+      <p:ext uri="{BB962C8B-B14F-4D97-AF65-F5344CB8AC3E}">
+        <p14:creationId xmlns:p14="http://schemas.microsoft.com/office/powerpoint/2010/main" val="1197738557"/>
+      </p:ext>
+    </p:extLst>
+  </p:cSld>
+  <p:clrMapOvr>
+    <a:masterClrMapping/>
+  </p:clrMapOvr>
+  <mc:AlternateContent xmlns:mc="http://schemas.openxmlformats.org/markup-compatibility/2006" xmlns:p14="http://schemas.microsoft.com/office/powerpoint/2010/main">
+    <mc:Choice Requires="p14">
+      <p:transition spd="slow" p14:dur="2000"/>
+    </mc:Choice>
+    <mc:Fallback xmlns="">
+      <p:transition spd="slow"/>
+    </mc:Fallback>
+  </mc:AlternateContent>
+  <p:timing>
+    <p:tnLst>
+      <p:par>
+        <p:cTn id="1" dur="indefinite" restart="never" nodeType="tmRoot"/>
+      </p:par>
+    </p:tnLst>
+  </p:timing>
+</p:sld>
+</file>
+
+<file path=ppt/slides/slide5.xml><?xml version="1.0" encoding="utf-8"?>
+<p:sld xmlns:a="http://schemas.openxmlformats.org/drawingml/2006/main" xmlns:r="http://schemas.openxmlformats.org/officeDocument/2006/relationships" xmlns:p="http://schemas.openxmlformats.org/presentationml/2006/main">
+  <p:cSld name="Slide21">
+    <p:spTree>
+      <p:nvGrpSpPr>
+        <p:cNvPr id="1" name=""/>
+        <p:cNvGrpSpPr/>
+        <p:nvPr/>
+      </p:nvGrpSpPr>
+      <p:grpSpPr>
+        <a:xfrm>
+          <a:off x="0" y="0"/>
+          <a:ext cx="0" cy="0"/>
+          <a:chOff x="0" y="0"/>
+          <a:chExt cx="0" cy="0"/>
+        </a:xfrm>
+      </p:grpSpPr>
+      <p:sp>
+        <p:nvSpPr>
+          <p:cNvPr id="2" name="Title 1"/>
+          <p:cNvSpPr txBox="1">
+            <a:spLocks noGrp="1"/>
+          </p:cNvSpPr>
+          <p:nvPr>
+            <p:ph type="title"/>
+          </p:nvPr>
+        </p:nvSpPr>
+        <p:spPr/>
+        <p:txBody>
+          <a:bodyPr/>
+          <a:lstStyle/>
+          <a:p>
+            <a:pPr lvl="0">
+              <a:buNone/>
+            </a:pPr>
+            <a:r>
+              <a:rPr lang="ru-RU" dirty="0" smtClean="0"/>
+              <a:t>Классификация компонент:</a:t>
+            </a:r>
+            <a:endParaRPr lang="ru-RU" dirty="0"/>
+          </a:p>
+        </p:txBody>
+      </p:sp>
+      <p:sp>
+        <p:nvSpPr>
+          <p:cNvPr id="3" name="Date Placeholder 2"/>
+          <p:cNvSpPr txBox="1"/>
+          <p:nvPr/>
+        </p:nvSpPr>
+        <p:spPr>
+          <a:xfrm>
+            <a:off x="107643" y="5292364"/>
+            <a:ext cx="1007997" cy="302757"/>
+          </a:xfrm>
+          <a:prstGeom prst="rect">
+            <a:avLst/>
+          </a:prstGeom>
+          <a:noFill/>
+          <a:ln>
+            <a:noFill/>
+          </a:ln>
+        </p:spPr>
+        <p:txBody>
+          <a:bodyPr vert="horz" wrap="square" lIns="91440" tIns="45720" rIns="91440" bIns="45720" anchor="t" anchorCtr="0" compatLnSpc="0"/>
+          <a:lstStyle/>
+          <a:p>
+            <a:pPr marL="0" marR="0" lvl="0" indent="0" algn="l" defTabSz="914400" rtl="0" fontAlgn="auto" hangingPunct="1">
+              <a:lnSpc>
+                <a:spcPct val="100000"/>
+              </a:lnSpc>
+              <a:spcBef>
+                <a:spcPts val="0"/>
+              </a:spcBef>
+              <a:spcAft>
+                <a:spcPts val="0"/>
+              </a:spcAft>
+              <a:buNone/>
+              <a:tabLst/>
+              <a:defRPr sz="1800" b="0" i="0" u="none" strike="noStrike" kern="0" cap="none" spc="0" baseline="0">
+                <a:solidFill>
+                  <a:srgbClr val="000000"/>
+                </a:solidFill>
+                <a:uFillTx/>
+              </a:defRPr>
+            </a:pPr>
+            <a:fld id="{C2DCE42C-1AC3-4409-BB7E-5371C59504E4}" type="datetime1">
+              <a:rPr lang="ru-RU" sz="1200" b="0" i="0" u="none" strike="noStrike" kern="1200" cap="none" spc="0" baseline="0">
+                <a:solidFill>
+                  <a:srgbClr val="000000"/>
+                </a:solidFill>
+                <a:uFillTx/>
+                <a:latin typeface="Arial" pitchFamily="34"/>
+                <a:ea typeface="WenQuanYi Zen Hei" pitchFamily="2"/>
+                <a:cs typeface="Arial" pitchFamily="34"/>
+              </a:rPr>
+              <a:pPr marL="0" marR="0" lvl="0" indent="0" algn="l" defTabSz="914400" rtl="0" fontAlgn="auto" hangingPunct="1">
+                <a:lnSpc>
+                  <a:spcPct val="100000"/>
+                </a:lnSpc>
+                <a:spcBef>
+                  <a:spcPts val="0"/>
+                </a:spcBef>
+                <a:spcAft>
+                  <a:spcPts val="0"/>
+                </a:spcAft>
+                <a:buNone/>
+                <a:tabLst/>
+                <a:defRPr sz="1800" b="0" i="0" u="none" strike="noStrike" kern="0" cap="none" spc="0" baseline="0">
+                  <a:solidFill>
+                    <a:srgbClr val="000000"/>
+                  </a:solidFill>
+                  <a:uFillTx/>
+                </a:defRPr>
+              </a:pPr>
+              <a:t>06.05.2014</a:t>
+            </a:fld>
+            <a:endParaRPr lang="ru-RU" sz="1200" b="0" i="0" u="none" strike="noStrike" kern="1200" cap="none" spc="0" baseline="0">
+              <a:solidFill>
+                <a:srgbClr val="000000"/>
+              </a:solidFill>
+              <a:uFillTx/>
+              <a:latin typeface="Arial" pitchFamily="34"/>
+              <a:ea typeface="WenQuanYi Zen Hei" pitchFamily="2"/>
+              <a:cs typeface="Arial" pitchFamily="34"/>
+            </a:endParaRPr>
+          </a:p>
+        </p:txBody>
+      </p:sp>
+      <p:sp>
+        <p:nvSpPr>
+          <p:cNvPr id="4" name="Footer Placeholder 3"/>
+          <p:cNvSpPr txBox="1"/>
+          <p:nvPr/>
+        </p:nvSpPr>
+        <p:spPr>
+          <a:xfrm>
+            <a:off x="1043641" y="5271122"/>
+            <a:ext cx="7108920" cy="302757"/>
+          </a:xfrm>
+          <a:prstGeom prst="rect">
+            <a:avLst/>
+          </a:prstGeom>
+          <a:noFill/>
+          <a:ln>
+            <a:noFill/>
+          </a:ln>
+        </p:spPr>
+        <p:txBody>
+          <a:bodyPr vert="horz" wrap="square" lIns="91440" tIns="45720" rIns="91440" bIns="45720" anchor="t" anchorCtr="1" compatLnSpc="0"/>
+          <a:lstStyle/>
+          <a:p>
+            <a:pPr marL="0" marR="0" lvl="0" indent="0" algn="ctr" defTabSz="914400" rtl="0" fontAlgn="auto" hangingPunct="1">
+              <a:lnSpc>
+                <a:spcPct val="100000"/>
+              </a:lnSpc>
+              <a:spcBef>
+                <a:spcPts val="0"/>
+              </a:spcBef>
+              <a:spcAft>
+                <a:spcPts val="0"/>
+              </a:spcAft>
+              <a:buNone/>
+              <a:tabLst/>
+              <a:defRPr sz="1800" b="0" i="0" u="none" strike="noStrike" kern="0" cap="none" spc="0" baseline="0">
+                <a:solidFill>
+                  <a:srgbClr val="000000"/>
+                </a:solidFill>
+                <a:uFillTx/>
+              </a:defRPr>
+            </a:pPr>
+            <a:r>
+              <a:rPr lang="ru-RU" sz="1200" b="0" i="0" u="none" strike="noStrike" kern="1200" cap="none" spc="0" baseline="0">
+                <a:solidFill>
+                  <a:srgbClr val="000000"/>
+                </a:solidFill>
+                <a:uFillTx/>
+                <a:latin typeface="Arial" pitchFamily="34"/>
+                <a:ea typeface="WenQuanYi Zen Hei" pitchFamily="2"/>
+                <a:cs typeface="Arial" pitchFamily="34"/>
+              </a:rPr>
+              <a:t>Лаборатория суперкомпьютерных технологий для биомедицины, фармакологии и малоразмерных структур</a:t>
+            </a:r>
+          </a:p>
+        </p:txBody>
+      </p:sp>
+      <p:sp>
+        <p:nvSpPr>
+          <p:cNvPr id="5" name="Slide Number Placeholder 4"/>
+          <p:cNvSpPr txBox="1"/>
+          <p:nvPr/>
+        </p:nvSpPr>
+        <p:spPr>
+          <a:xfrm>
+            <a:off x="8460357" y="5292364"/>
+            <a:ext cx="515154" cy="302757"/>
+          </a:xfrm>
+          <a:prstGeom prst="rect">
+            <a:avLst/>
+          </a:prstGeom>
+          <a:noFill/>
+          <a:ln>
+            <a:noFill/>
+          </a:ln>
+        </p:spPr>
+        <p:txBody>
+          <a:bodyPr vert="horz" wrap="square" lIns="91440" tIns="45720" rIns="91440" bIns="45720" anchor="t" anchorCtr="0" compatLnSpc="0"/>
+          <a:lstStyle/>
+          <a:p>
+            <a:pPr marL="0" marR="0" lvl="0" indent="0" algn="l" defTabSz="914400" rtl="0" fontAlgn="auto" hangingPunct="1">
+              <a:lnSpc>
+                <a:spcPct val="100000"/>
+              </a:lnSpc>
+              <a:spcBef>
+                <a:spcPts val="0"/>
+              </a:spcBef>
+              <a:spcAft>
+                <a:spcPts val="0"/>
+              </a:spcAft>
+              <a:buNone/>
+              <a:tabLst/>
+              <a:defRPr sz="1800" b="0" i="0" u="none" strike="noStrike" kern="0" cap="none" spc="0" baseline="0">
+                <a:solidFill>
+                  <a:srgbClr val="000000"/>
+                </a:solidFill>
+                <a:uFillTx/>
+              </a:defRPr>
+            </a:pPr>
+            <a:fld id="{82045C0D-E460-4CA0-80AA-3B684EFF4D9A}" type="slidenum">
+              <a:t>5</a:t>
             </a:fld>
             <a:endParaRPr lang="ru-RU" sz="1400" b="0" i="0" u="none" strike="noStrike" kern="1200" cap="none" spc="0" baseline="0">
               <a:solidFill>
@@ -8857,325 +9008,6 @@
         </p:spPr>
       </p:pic>
     </p:spTree>
-  </p:cSld>
-  <p:clrMapOvr>
-    <a:masterClrMapping/>
-  </p:clrMapOvr>
-  <mc:AlternateContent xmlns:mc="http://schemas.openxmlformats.org/markup-compatibility/2006" xmlns:p14="http://schemas.microsoft.com/office/powerpoint/2010/main">
-    <mc:Choice Requires="p14">
-      <p:transition spd="slow" p14:dur="2000"/>
-    </mc:Choice>
-    <mc:Fallback xmlns="">
-      <p:transition spd="slow"/>
-    </mc:Fallback>
-  </mc:AlternateContent>
-  <p:timing>
-    <p:tnLst>
-      <p:par>
-        <p:cTn id="1" dur="indefinite" restart="never" nodeType="tmRoot"/>
-      </p:par>
-    </p:tnLst>
-  </p:timing>
-</p:sld>
-</file>
-
-<file path=ppt/slides/slide5.xml><?xml version="1.0" encoding="utf-8"?>
-<p:sld xmlns:a="http://schemas.openxmlformats.org/drawingml/2006/main" xmlns:r="http://schemas.openxmlformats.org/officeDocument/2006/relationships" xmlns:p="http://schemas.openxmlformats.org/presentationml/2006/main">
-  <p:cSld>
-    <p:spTree>
-      <p:nvGrpSpPr>
-        <p:cNvPr id="1" name=""/>
-        <p:cNvGrpSpPr/>
-        <p:nvPr/>
-      </p:nvGrpSpPr>
-      <p:grpSpPr>
-        <a:xfrm>
-          <a:off x="0" y="0"/>
-          <a:ext cx="0" cy="0"/>
-          <a:chOff x="0" y="0"/>
-          <a:chExt cx="0" cy="0"/>
-        </a:xfrm>
-      </p:grpSpPr>
-      <p:sp>
-        <p:nvSpPr>
-          <p:cNvPr id="2" name="Title 1"/>
-          <p:cNvSpPr txBox="1">
-            <a:spLocks noGrp="1"/>
-          </p:cNvSpPr>
-          <p:nvPr>
-            <p:ph type="title"/>
-          </p:nvPr>
-        </p:nvSpPr>
-        <p:spPr/>
-        <p:txBody>
-          <a:bodyPr/>
-          <a:lstStyle/>
-          <a:p>
-            <a:pPr lvl="0">
-              <a:buNone/>
-            </a:pPr>
-            <a:r>
-              <a:rPr lang="ru-RU" dirty="0" smtClean="0"/>
-              <a:t>Вопрос</a:t>
-            </a:r>
-            <a:endParaRPr lang="ru-RU" dirty="0"/>
-          </a:p>
-        </p:txBody>
-      </p:sp>
-      <p:sp>
-        <p:nvSpPr>
-          <p:cNvPr id="3" name="Date Placeholder 2"/>
-          <p:cNvSpPr txBox="1"/>
-          <p:nvPr/>
-        </p:nvSpPr>
-        <p:spPr>
-          <a:xfrm>
-            <a:off x="107643" y="5292364"/>
-            <a:ext cx="1007997" cy="302757"/>
-          </a:xfrm>
-          <a:prstGeom prst="rect">
-            <a:avLst/>
-          </a:prstGeom>
-          <a:noFill/>
-          <a:ln>
-            <a:noFill/>
-          </a:ln>
-        </p:spPr>
-        <p:txBody>
-          <a:bodyPr vert="horz" wrap="square" lIns="91440" tIns="45720" rIns="91440" bIns="45720" anchor="t" anchorCtr="0" compatLnSpc="0"/>
-          <a:lstStyle/>
-          <a:p>
-            <a:pPr marL="0" marR="0" lvl="0" indent="0" algn="l" defTabSz="914400" rtl="0" fontAlgn="auto" hangingPunct="1">
-              <a:lnSpc>
-                <a:spcPct val="100000"/>
-              </a:lnSpc>
-              <a:spcBef>
-                <a:spcPts val="0"/>
-              </a:spcBef>
-              <a:spcAft>
-                <a:spcPts val="0"/>
-              </a:spcAft>
-              <a:buNone/>
-              <a:tabLst/>
-              <a:defRPr sz="1800" b="0" i="0" u="none" strike="noStrike" kern="0" cap="none" spc="0" baseline="0">
-                <a:solidFill>
-                  <a:srgbClr val="000000"/>
-                </a:solidFill>
-                <a:uFillTx/>
-              </a:defRPr>
-            </a:pPr>
-            <a:fld id="{C2DCE42C-1AC3-4409-BB7E-5371C59504E4}" type="datetime1">
-              <a:rPr lang="ru-RU" sz="1200" b="0" i="0" u="none" strike="noStrike" kern="1200" cap="none" spc="0" baseline="0">
-                <a:solidFill>
-                  <a:srgbClr val="000000"/>
-                </a:solidFill>
-                <a:uFillTx/>
-                <a:latin typeface="Arial" pitchFamily="34"/>
-                <a:ea typeface="WenQuanYi Zen Hei" pitchFamily="2"/>
-                <a:cs typeface="Arial" pitchFamily="34"/>
-              </a:rPr>
-              <a:pPr marL="0" marR="0" lvl="0" indent="0" algn="l" defTabSz="914400" rtl="0" fontAlgn="auto" hangingPunct="1">
-                <a:lnSpc>
-                  <a:spcPct val="100000"/>
-                </a:lnSpc>
-                <a:spcBef>
-                  <a:spcPts val="0"/>
-                </a:spcBef>
-                <a:spcAft>
-                  <a:spcPts val="0"/>
-                </a:spcAft>
-                <a:buNone/>
-                <a:tabLst/>
-                <a:defRPr sz="1800" b="0" i="0" u="none" strike="noStrike" kern="0" cap="none" spc="0" baseline="0">
-                  <a:solidFill>
-                    <a:srgbClr val="000000"/>
-                  </a:solidFill>
-                  <a:uFillTx/>
-                </a:defRPr>
-              </a:pPr>
-              <a:t>06.05.2014</a:t>
-            </a:fld>
-            <a:endParaRPr lang="ru-RU" sz="1200" b="0" i="0" u="none" strike="noStrike" kern="1200" cap="none" spc="0" baseline="0">
-              <a:solidFill>
-                <a:srgbClr val="000000"/>
-              </a:solidFill>
-              <a:uFillTx/>
-              <a:latin typeface="Arial" pitchFamily="34"/>
-              <a:ea typeface="WenQuanYi Zen Hei" pitchFamily="2"/>
-              <a:cs typeface="Arial" pitchFamily="34"/>
-            </a:endParaRPr>
-          </a:p>
-        </p:txBody>
-      </p:sp>
-      <p:sp>
-        <p:nvSpPr>
-          <p:cNvPr id="4" name="Footer Placeholder 3"/>
-          <p:cNvSpPr txBox="1"/>
-          <p:nvPr/>
-        </p:nvSpPr>
-        <p:spPr>
-          <a:xfrm>
-            <a:off x="1043641" y="5271122"/>
-            <a:ext cx="7108920" cy="302757"/>
-          </a:xfrm>
-          <a:prstGeom prst="rect">
-            <a:avLst/>
-          </a:prstGeom>
-          <a:noFill/>
-          <a:ln>
-            <a:noFill/>
-          </a:ln>
-        </p:spPr>
-        <p:txBody>
-          <a:bodyPr vert="horz" wrap="square" lIns="91440" tIns="45720" rIns="91440" bIns="45720" anchor="t" anchorCtr="1" compatLnSpc="0"/>
-          <a:lstStyle/>
-          <a:p>
-            <a:pPr marL="0" marR="0" lvl="0" indent="0" algn="ctr" defTabSz="914400" rtl="0" fontAlgn="auto" hangingPunct="1">
-              <a:lnSpc>
-                <a:spcPct val="100000"/>
-              </a:lnSpc>
-              <a:spcBef>
-                <a:spcPts val="0"/>
-              </a:spcBef>
-              <a:spcAft>
-                <a:spcPts val="0"/>
-              </a:spcAft>
-              <a:buNone/>
-              <a:tabLst/>
-              <a:defRPr sz="1800" b="0" i="0" u="none" strike="noStrike" kern="0" cap="none" spc="0" baseline="0">
-                <a:solidFill>
-                  <a:srgbClr val="000000"/>
-                </a:solidFill>
-                <a:uFillTx/>
-              </a:defRPr>
-            </a:pPr>
-            <a:r>
-              <a:rPr lang="ru-RU" sz="1200" b="0" i="0" u="none" strike="noStrike" kern="1200" cap="none" spc="0" baseline="0">
-                <a:solidFill>
-                  <a:srgbClr val="000000"/>
-                </a:solidFill>
-                <a:uFillTx/>
-                <a:latin typeface="Arial" pitchFamily="34"/>
-                <a:ea typeface="WenQuanYi Zen Hei" pitchFamily="2"/>
-                <a:cs typeface="Arial" pitchFamily="34"/>
-              </a:rPr>
-              <a:t>Лаборатория суперкомпьютерных технологий для биомедицины, фармакологии и малоразмерных структур</a:t>
-            </a:r>
-          </a:p>
-        </p:txBody>
-      </p:sp>
-      <p:sp>
-        <p:nvSpPr>
-          <p:cNvPr id="5" name="Slide Number Placeholder 4"/>
-          <p:cNvSpPr txBox="1"/>
-          <p:nvPr/>
-        </p:nvSpPr>
-        <p:spPr>
-          <a:xfrm>
-            <a:off x="8460357" y="5292364"/>
-            <a:ext cx="515154" cy="302757"/>
-          </a:xfrm>
-          <a:prstGeom prst="rect">
-            <a:avLst/>
-          </a:prstGeom>
-          <a:noFill/>
-          <a:ln>
-            <a:noFill/>
-          </a:ln>
-        </p:spPr>
-        <p:txBody>
-          <a:bodyPr vert="horz" wrap="square" lIns="91440" tIns="45720" rIns="91440" bIns="45720" anchor="t" anchorCtr="0" compatLnSpc="0"/>
-          <a:lstStyle/>
-          <a:p>
-            <a:pPr marL="0" marR="0" lvl="0" indent="0" algn="l" defTabSz="914400" rtl="0" fontAlgn="auto" hangingPunct="1">
-              <a:lnSpc>
-                <a:spcPct val="100000"/>
-              </a:lnSpc>
-              <a:spcBef>
-                <a:spcPts val="0"/>
-              </a:spcBef>
-              <a:spcAft>
-                <a:spcPts val="0"/>
-              </a:spcAft>
-              <a:buNone/>
-              <a:tabLst/>
-              <a:defRPr sz="1800" b="0" i="0" u="none" strike="noStrike" kern="0" cap="none" spc="0" baseline="0">
-                <a:solidFill>
-                  <a:srgbClr val="000000"/>
-                </a:solidFill>
-                <a:uFillTx/>
-              </a:defRPr>
-            </a:pPr>
-            <a:fld id="{82045C0D-E460-4CA0-80AA-3B684EFF4D9A}" type="slidenum">
-              <a:t>5</a:t>
-            </a:fld>
-            <a:endParaRPr lang="ru-RU" sz="1400" b="0" i="0" u="none" strike="noStrike" kern="1200" cap="none" spc="0" baseline="0">
-              <a:solidFill>
-                <a:srgbClr val="000000"/>
-              </a:solidFill>
-              <a:uFillTx/>
-              <a:latin typeface="Calibri" pitchFamily="18"/>
-              <a:ea typeface="WenQuanYi Zen Hei" pitchFamily="2"/>
-              <a:cs typeface="Lohit Hindi" pitchFamily="2"/>
-            </a:endParaRPr>
-          </a:p>
-        </p:txBody>
-      </p:sp>
-      <p:sp>
-        <p:nvSpPr>
-          <p:cNvPr id="7" name="TextBox 6"/>
-          <p:cNvSpPr txBox="1"/>
-          <p:nvPr/>
-        </p:nvSpPr>
-        <p:spPr>
-          <a:xfrm>
-            <a:off x="457200" y="1547862"/>
-            <a:ext cx="8229600" cy="1754326"/>
-          </a:xfrm>
-          <a:prstGeom prst="rect">
-            <a:avLst/>
-          </a:prstGeom>
-          <a:ln>
-            <a:noFill/>
-          </a:ln>
-        </p:spPr>
-        <p:style>
-          <a:lnRef idx="2">
-            <a:schemeClr val="dk1"/>
-          </a:lnRef>
-          <a:fillRef idx="1">
-            <a:schemeClr val="lt1"/>
-          </a:fillRef>
-          <a:effectRef idx="0">
-            <a:schemeClr val="dk1"/>
-          </a:effectRef>
-          <a:fontRef idx="minor">
-            <a:schemeClr val="dk1"/>
-          </a:fontRef>
-        </p:style>
-        <p:txBody>
-          <a:bodyPr wrap="square" rtlCol="0">
-            <a:spAutoFit/>
-          </a:bodyPr>
-          <a:lstStyle/>
-          <a:p>
-            <a:r>
-              <a:rPr lang="ru-RU" sz="3600" dirty="0" smtClean="0">
-                <a:latin typeface="DejaVu Sans" panose="020B0603030804020204" pitchFamily="34" charset="0"/>
-                <a:ea typeface="DejaVu Sans" panose="020B0603030804020204" pitchFamily="34" charset="0"/>
-                <a:cs typeface="DejaVu Sans" panose="020B0603030804020204" pitchFamily="34" charset="0"/>
-              </a:rPr>
-              <a:t>На каком языке программирования должен быть написан симулятор?</a:t>
-            </a:r>
-          </a:p>
-        </p:txBody>
-      </p:sp>
-    </p:spTree>
-    <p:extLst>
-      <p:ext uri="{BB962C8B-B14F-4D97-AF65-F5344CB8AC3E}">
-        <p14:creationId xmlns:p14="http://schemas.microsoft.com/office/powerpoint/2010/main" val="1197738557"/>
-      </p:ext>
-    </p:extLst>
   </p:cSld>
   <p:clrMapOvr>
     <a:masterClrMapping/>
@@ -9245,7 +9077,13 @@
               <a:rPr lang="en-US" dirty="0">
                 <a:latin typeface="Constantia" pitchFamily="18" charset="0"/>
               </a:rPr>
-              <a:t>C, C++, …</a:t>
+              <a:t>C, C</a:t>
+            </a:r>
+            <a:r>
+              <a:rPr lang="en-US" dirty="0" smtClean="0">
+                <a:latin typeface="Constantia" pitchFamily="18" charset="0"/>
+              </a:rPr>
+              <a:t>++…</a:t>
             </a:r>
             <a:r>
               <a:rPr lang="ru-RU" dirty="0">

</xml_diff>